<commit_message>
FIG for Guides : More graphs for tech guide unstructured geometry chapter.
</commit_message>
<xml_diff>
--- a/fds/Geometry_Figures/CutCellsIBSketchNormal.pptx
+++ b/fds/Geometry_Figures/CutCellsIBSketchNormal.pptx
@@ -5,7 +5,7 @@
     <p:sldMasterId id="2147483648" r:id="rId1"/>
   </p:sldMasterIdLst>
   <p:sldIdLst>
-    <p:sldId id="258" r:id="rId2"/>
+    <p:sldId id="260" r:id="rId2"/>
   </p:sldIdLst>
   <p:sldSz cx="9144000" cy="6858000" type="screen4x3"/>
   <p:notesSz cx="6858000" cy="9144000"/>
@@ -302,7 +302,7 @@
           <a:p>
             <a:fld id="{494A5700-4F78-D245-AE2B-234359B87ED0}" type="datetimeFigureOut">
               <a:rPr lang="en-US" smtClean="0"/>
-              <a:t>6/5/18</a:t>
+              <a:t>4/28/21</a:t>
             </a:fld>
             <a:endParaRPr lang="en-US"/>
           </a:p>
@@ -470,7 +470,7 @@
           <a:p>
             <a:fld id="{494A5700-4F78-D245-AE2B-234359B87ED0}" type="datetimeFigureOut">
               <a:rPr lang="en-US" smtClean="0"/>
-              <a:t>6/5/18</a:t>
+              <a:t>4/28/21</a:t>
             </a:fld>
             <a:endParaRPr lang="en-US"/>
           </a:p>
@@ -648,7 +648,7 @@
           <a:p>
             <a:fld id="{494A5700-4F78-D245-AE2B-234359B87ED0}" type="datetimeFigureOut">
               <a:rPr lang="en-US" smtClean="0"/>
-              <a:t>6/5/18</a:t>
+              <a:t>4/28/21</a:t>
             </a:fld>
             <a:endParaRPr lang="en-US"/>
           </a:p>
@@ -816,7 +816,7 @@
           <a:p>
             <a:fld id="{494A5700-4F78-D245-AE2B-234359B87ED0}" type="datetimeFigureOut">
               <a:rPr lang="en-US" smtClean="0"/>
-              <a:t>6/5/18</a:t>
+              <a:t>4/28/21</a:t>
             </a:fld>
             <a:endParaRPr lang="en-US"/>
           </a:p>
@@ -1061,7 +1061,7 @@
           <a:p>
             <a:fld id="{494A5700-4F78-D245-AE2B-234359B87ED0}" type="datetimeFigureOut">
               <a:rPr lang="en-US" smtClean="0"/>
-              <a:t>6/5/18</a:t>
+              <a:t>4/28/21</a:t>
             </a:fld>
             <a:endParaRPr lang="en-US"/>
           </a:p>
@@ -1346,7 +1346,7 @@
           <a:p>
             <a:fld id="{494A5700-4F78-D245-AE2B-234359B87ED0}" type="datetimeFigureOut">
               <a:rPr lang="en-US" smtClean="0"/>
-              <a:t>6/5/18</a:t>
+              <a:t>4/28/21</a:t>
             </a:fld>
             <a:endParaRPr lang="en-US"/>
           </a:p>
@@ -1765,7 +1765,7 @@
           <a:p>
             <a:fld id="{494A5700-4F78-D245-AE2B-234359B87ED0}" type="datetimeFigureOut">
               <a:rPr lang="en-US" smtClean="0"/>
-              <a:t>6/5/18</a:t>
+              <a:t>4/28/21</a:t>
             </a:fld>
             <a:endParaRPr lang="en-US"/>
           </a:p>
@@ -1882,7 +1882,7 @@
           <a:p>
             <a:fld id="{494A5700-4F78-D245-AE2B-234359B87ED0}" type="datetimeFigureOut">
               <a:rPr lang="en-US" smtClean="0"/>
-              <a:t>6/5/18</a:t>
+              <a:t>4/28/21</a:t>
             </a:fld>
             <a:endParaRPr lang="en-US"/>
           </a:p>
@@ -1977,7 +1977,7 @@
           <a:p>
             <a:fld id="{494A5700-4F78-D245-AE2B-234359B87ED0}" type="datetimeFigureOut">
               <a:rPr lang="en-US" smtClean="0"/>
-              <a:t>6/5/18</a:t>
+              <a:t>4/28/21</a:t>
             </a:fld>
             <a:endParaRPr lang="en-US"/>
           </a:p>
@@ -2252,7 +2252,7 @@
           <a:p>
             <a:fld id="{494A5700-4F78-D245-AE2B-234359B87ED0}" type="datetimeFigureOut">
               <a:rPr lang="en-US" smtClean="0"/>
-              <a:t>6/5/18</a:t>
+              <a:t>4/28/21</a:t>
             </a:fld>
             <a:endParaRPr lang="en-US"/>
           </a:p>
@@ -2504,7 +2504,7 @@
           <a:p>
             <a:fld id="{494A5700-4F78-D245-AE2B-234359B87ED0}" type="datetimeFigureOut">
               <a:rPr lang="en-US" smtClean="0"/>
-              <a:t>6/5/18</a:t>
+              <a:t>4/28/21</a:t>
             </a:fld>
             <a:endParaRPr lang="en-US"/>
           </a:p>
@@ -2715,7 +2715,7 @@
           <a:p>
             <a:fld id="{494A5700-4F78-D245-AE2B-234359B87ED0}" type="datetimeFigureOut">
               <a:rPr lang="en-US" smtClean="0"/>
-              <a:t>6/5/18</a:t>
+              <a:t>4/28/21</a:t>
             </a:fld>
             <a:endParaRPr lang="en-US"/>
           </a:p>
@@ -3099,9 +3099,9 @@
           <p:nvPr/>
         </p:nvCxnSpPr>
         <p:spPr>
-          <a:xfrm flipV="1">
-            <a:off x="4065181" y="862522"/>
-            <a:ext cx="0" cy="4909225"/>
+          <a:xfrm flipH="1" flipV="1">
+            <a:off x="4707375" y="1418897"/>
+            <a:ext cx="9447" cy="3585596"/>
           </a:xfrm>
           <a:prstGeom prst="line">
             <a:avLst/>
@@ -3132,7 +3132,7 @@
         </p:nvCxnSpPr>
         <p:spPr>
           <a:xfrm>
-            <a:off x="2462622" y="4574216"/>
+            <a:off x="3114263" y="3806961"/>
             <a:ext cx="1600489" cy="1864"/>
           </a:xfrm>
           <a:prstGeom prst="line">
@@ -3170,7 +3170,7 @@
         </p:nvCxnSpPr>
         <p:spPr>
           <a:xfrm flipV="1">
-            <a:off x="3246773" y="3926323"/>
+            <a:off x="3898414" y="3159068"/>
             <a:ext cx="18804" cy="1390724"/>
           </a:xfrm>
           <a:prstGeom prst="line">
@@ -3208,8 +3208,8 @@
         </p:nvCxnSpPr>
         <p:spPr>
           <a:xfrm flipH="1">
-            <a:off x="2072129" y="3892975"/>
-            <a:ext cx="5418169" cy="33347"/>
+            <a:off x="2723771" y="3144640"/>
+            <a:ext cx="3971318" cy="14427"/>
           </a:xfrm>
           <a:prstGeom prst="line">
             <a:avLst/>
@@ -3240,8 +3240,8 @@
         </p:nvCxnSpPr>
         <p:spPr>
           <a:xfrm flipH="1">
-            <a:off x="2072128" y="5289959"/>
-            <a:ext cx="5418170" cy="27088"/>
+            <a:off x="2723769" y="4543308"/>
+            <a:ext cx="3885156" cy="6484"/>
           </a:xfrm>
           <a:prstGeom prst="line">
             <a:avLst/>
@@ -3272,8 +3272,8 @@
         </p:nvCxnSpPr>
         <p:spPr>
           <a:xfrm flipV="1">
-            <a:off x="2454903" y="862522"/>
-            <a:ext cx="33441" cy="4909225"/>
+            <a:off x="3106544" y="1418897"/>
+            <a:ext cx="17749" cy="3585596"/>
           </a:xfrm>
           <a:prstGeom prst="line">
             <a:avLst/>
@@ -3302,7 +3302,7 @@
         </p:nvSpPr>
         <p:spPr>
           <a:xfrm>
-            <a:off x="3658543" y="4174183"/>
+            <a:off x="4310184" y="3406928"/>
             <a:ext cx="99199" cy="110909"/>
           </a:xfrm>
           <a:prstGeom prst="ellipse">
@@ -3346,7 +3346,7 @@
         </p:nvCxnSpPr>
         <p:spPr>
           <a:xfrm flipH="1">
-            <a:off x="2777268" y="3916660"/>
+            <a:off x="3428909" y="3149405"/>
             <a:ext cx="1278466" cy="6183"/>
           </a:xfrm>
           <a:prstGeom prst="line">
@@ -3383,7 +3383,7 @@
         </p:nvCxnSpPr>
         <p:spPr>
           <a:xfrm flipH="1" flipV="1">
-            <a:off x="4059292" y="3911867"/>
+            <a:off x="4710933" y="3144612"/>
             <a:ext cx="8024" cy="1194434"/>
           </a:xfrm>
           <a:prstGeom prst="line">
@@ -3418,7 +3418,7 @@
         </p:nvCxnSpPr>
         <p:spPr>
           <a:xfrm>
-            <a:off x="3919149" y="4581442"/>
+            <a:off x="4570790" y="3814187"/>
             <a:ext cx="394723" cy="0"/>
           </a:xfrm>
           <a:prstGeom prst="line">
@@ -3456,20 +3456,20 @@
           <p:nvPr>
             <p:extLst>
               <p:ext uri="{D42A27DB-BD31-4B8C-83A1-F6EECF244321}">
-                <p14:modId xmlns:p14="http://schemas.microsoft.com/office/powerpoint/2010/main" val="3066873151"/>
+                <p14:modId xmlns:p14="http://schemas.microsoft.com/office/powerpoint/2010/main" val="901744808"/>
               </p:ext>
             </p:extLst>
           </p:nvPr>
         </p:nvGraphicFramePr>
         <p:xfrm>
-          <a:off x="3725008" y="4003134"/>
+          <a:off x="4376649" y="3235879"/>
           <a:ext cx="172933" cy="223453"/>
         </p:xfrm>
         <a:graphic>
           <a:graphicData uri="http://schemas.openxmlformats.org/presentationml/2006/ole">
             <mc:AlternateContent xmlns:mc="http://schemas.openxmlformats.org/markup-compatibility/2006">
               <mc:Choice xmlns:v="urn:schemas-microsoft-com:vml" Requires="v">
-                <p:oleObj spid="_x0000_s2119" name="Equation" r:id="rId3" imgW="177800" imgH="215900" progId="Equation.3">
+                <p:oleObj spid="_x0000_s3073" name="Equation" r:id="rId3" imgW="177800" imgH="215900" progId="Equation.3">
                   <p:embed/>
                 </p:oleObj>
               </mc:Choice>
@@ -3490,7 +3490,7 @@
                     </p:blipFill>
                     <p:spPr>
                       <a:xfrm>
-                        <a:off x="3725008" y="4003134"/>
+                        <a:off x="4376649" y="3235879"/>
                         <a:ext cx="172933" cy="223453"/>
                       </a:xfrm>
                       <a:prstGeom prst="rect">
@@ -3514,7 +3514,7 @@
         </p:nvCxnSpPr>
         <p:spPr>
           <a:xfrm flipV="1">
-            <a:off x="6503242" y="4856944"/>
+            <a:off x="5820951" y="3608096"/>
             <a:ext cx="374674" cy="11322"/>
           </a:xfrm>
           <a:prstGeom prst="straightConnector1">
@@ -3552,7 +3552,7 @@
         </p:nvCxnSpPr>
         <p:spPr>
           <a:xfrm flipV="1">
-            <a:off x="6503242" y="4501168"/>
+            <a:off x="5820951" y="3252320"/>
             <a:ext cx="0" cy="367098"/>
           </a:xfrm>
           <a:prstGeom prst="straightConnector1">
@@ -3589,9 +3589,9 @@
           <p:nvPr/>
         </p:nvCxnSpPr>
         <p:spPr>
-          <a:xfrm flipH="1" flipV="1">
-            <a:off x="5642821" y="862522"/>
-            <a:ext cx="251" cy="4791536"/>
+          <a:xfrm flipV="1">
+            <a:off x="6294714" y="1418897"/>
+            <a:ext cx="13834" cy="3467906"/>
           </a:xfrm>
           <a:prstGeom prst="line">
             <a:avLst/>
@@ -3621,9 +3621,9 @@
           <p:nvPr/>
         </p:nvCxnSpPr>
         <p:spPr>
-          <a:xfrm flipH="1">
-            <a:off x="2072129" y="2499857"/>
-            <a:ext cx="5418169" cy="27521"/>
+          <a:xfrm flipH="1" flipV="1">
+            <a:off x="2723771" y="1760123"/>
+            <a:ext cx="3971318" cy="28048"/>
           </a:xfrm>
           <a:prstGeom prst="line">
             <a:avLst/>
@@ -3654,7 +3654,7 @@
         </p:nvCxnSpPr>
         <p:spPr>
           <a:xfrm flipV="1">
-            <a:off x="3593038" y="3639448"/>
+            <a:off x="4244679" y="2872193"/>
             <a:ext cx="0" cy="395286"/>
           </a:xfrm>
           <a:prstGeom prst="line">
@@ -3691,7 +3691,7 @@
         </p:nvSpPr>
         <p:spPr>
           <a:xfrm>
-            <a:off x="4117378" y="4845453"/>
+            <a:off x="4769019" y="4078198"/>
             <a:ext cx="198236" cy="207825"/>
           </a:xfrm>
           <a:prstGeom prst="ellipse">
@@ -3743,20 +3743,20 @@
           <p:nvPr>
             <p:extLst>
               <p:ext uri="{D42A27DB-BD31-4B8C-83A1-F6EECF244321}">
-                <p14:modId xmlns:p14="http://schemas.microsoft.com/office/powerpoint/2010/main" val="3626899136"/>
+                <p14:modId xmlns:p14="http://schemas.microsoft.com/office/powerpoint/2010/main" val="2386132915"/>
               </p:ext>
             </p:extLst>
           </p:nvPr>
         </p:nvGraphicFramePr>
         <p:xfrm>
-          <a:off x="3026000" y="4621065"/>
+          <a:off x="3677641" y="3853810"/>
           <a:ext cx="199618" cy="198596"/>
         </p:xfrm>
         <a:graphic>
           <a:graphicData uri="http://schemas.openxmlformats.org/presentationml/2006/ole">
             <mc:AlternateContent xmlns:mc="http://schemas.openxmlformats.org/markup-compatibility/2006">
               <mc:Choice xmlns:v="urn:schemas-microsoft-com:vml" Requires="v">
-                <p:oleObj spid="_x0000_s2120" name="Equation" r:id="rId5" imgW="203200" imgH="190500" progId="Equation.3">
+                <p:oleObj spid="_x0000_s3074" name="Equation" r:id="rId5" imgW="203200" imgH="190500" progId="Equation.3">
                   <p:embed/>
                 </p:oleObj>
               </mc:Choice>
@@ -3777,7 +3777,7 @@
                     </p:blipFill>
                     <p:spPr>
                       <a:xfrm>
-                        <a:off x="3026000" y="4621065"/>
+                        <a:off x="3677641" y="3853810"/>
                         <a:ext cx="199618" cy="198596"/>
                       </a:xfrm>
                       <a:prstGeom prst="rect">
@@ -3801,7 +3801,7 @@
         </p:nvCxnSpPr>
         <p:spPr>
           <a:xfrm>
-            <a:off x="3578851" y="4527095"/>
+            <a:off x="4230492" y="3759840"/>
             <a:ext cx="1027500" cy="1244652"/>
           </a:xfrm>
           <a:prstGeom prst="line">
@@ -3844,7 +3844,7 @@
         </p:nvCxnSpPr>
         <p:spPr>
           <a:xfrm>
-            <a:off x="3955008" y="4416028"/>
+            <a:off x="4606649" y="3648773"/>
             <a:ext cx="368182" cy="6306"/>
           </a:xfrm>
           <a:prstGeom prst="line">
@@ -3873,50 +3873,6 @@
           </a:fontRef>
         </p:style>
       </p:cxnSp>
-      <p:cxnSp>
-        <p:nvCxnSpPr>
-          <p:cNvPr id="32" name="Straight Connector 31">
-            <a:extLst>
-              <a:ext uri="{FF2B5EF4-FFF2-40B4-BE49-F238E27FC236}">
-                <a16:creationId xmlns:a16="http://schemas.microsoft.com/office/drawing/2014/main" id="{5F251DA1-B650-7940-97CD-F7605DAE3231}"/>
-              </a:ext>
-            </a:extLst>
-          </p:cNvPr>
-          <p:cNvCxnSpPr>
-            <a:cxnSpLocks/>
-          </p:cNvCxnSpPr>
-          <p:nvPr/>
-        </p:nvCxnSpPr>
-        <p:spPr>
-          <a:xfrm flipV="1">
-            <a:off x="3802793" y="2770558"/>
-            <a:ext cx="1872453" cy="1891386"/>
-          </a:xfrm>
-          <a:prstGeom prst="line">
-            <a:avLst/>
-          </a:prstGeom>
-          <a:ln>
-            <a:solidFill>
-              <a:schemeClr val="tx1"/>
-            </a:solidFill>
-            <a:prstDash val="dash"/>
-          </a:ln>
-        </p:spPr>
-        <p:style>
-          <a:lnRef idx="2">
-            <a:schemeClr val="accent1"/>
-          </a:lnRef>
-          <a:fillRef idx="0">
-            <a:schemeClr val="accent1"/>
-          </a:fillRef>
-          <a:effectRef idx="1">
-            <a:schemeClr val="accent1"/>
-          </a:effectRef>
-          <a:fontRef idx="minor">
-            <a:schemeClr val="tx1"/>
-          </a:fontRef>
-        </p:style>
-      </p:cxnSp>
       <p:sp>
         <p:nvSpPr>
           <p:cNvPr id="114" name="Oval 113">
@@ -3931,7 +3887,7 @@
         </p:nvSpPr>
         <p:spPr>
           <a:xfrm>
-            <a:off x="3562132" y="3890859"/>
+            <a:off x="4213773" y="3123604"/>
             <a:ext cx="61136" cy="58709"/>
           </a:xfrm>
           <a:prstGeom prst="ellipse">
@@ -3973,7 +3929,7 @@
         </p:nvSpPr>
         <p:spPr>
           <a:xfrm>
-            <a:off x="4032543" y="4386673"/>
+            <a:off x="4684184" y="3619418"/>
             <a:ext cx="61136" cy="58709"/>
           </a:xfrm>
           <a:prstGeom prst="ellipse">
@@ -4021,7 +3977,7 @@
         </p:nvSpPr>
         <p:spPr>
           <a:xfrm>
-            <a:off x="2941605" y="3674478"/>
+            <a:off x="3593246" y="2907223"/>
             <a:ext cx="228843" cy="211796"/>
           </a:xfrm>
           <a:prstGeom prst="ellipse">
@@ -4064,62 +4020,14 @@
           </a:p>
         </p:txBody>
       </p:sp>
-      <p:sp>
-        <p:nvSpPr>
-          <p:cNvPr id="139" name="Oval 138">
-            <a:extLst>
-              <a:ext uri="{FF2B5EF4-FFF2-40B4-BE49-F238E27FC236}">
-                <a16:creationId xmlns:a16="http://schemas.microsoft.com/office/drawing/2014/main" id="{5C6492D4-D80D-E047-9CAA-4E7FED705C3A}"/>
-              </a:ext>
-            </a:extLst>
-          </p:cNvPr>
-          <p:cNvSpPr/>
-          <p:nvPr/>
-        </p:nvSpPr>
-        <p:spPr>
-          <a:xfrm>
-            <a:off x="3710685" y="4691024"/>
-            <a:ext cx="75649" cy="87517"/>
-          </a:xfrm>
-          <a:prstGeom prst="ellipse">
-            <a:avLst/>
-          </a:prstGeom>
-        </p:spPr>
-        <p:style>
-          <a:lnRef idx="1">
-            <a:schemeClr val="dk1"/>
-          </a:lnRef>
-          <a:fillRef idx="3">
-            <a:schemeClr val="dk1"/>
-          </a:fillRef>
-          <a:effectRef idx="2">
-            <a:schemeClr val="dk1"/>
-          </a:effectRef>
-          <a:fontRef idx="minor">
-            <a:schemeClr val="lt1"/>
-          </a:fontRef>
-        </p:style>
-        <p:txBody>
-          <a:bodyPr rtlCol="0" anchor="ctr"/>
-          <a:lstStyle/>
-          <a:p>
-            <a:pPr algn="ctr"/>
-            <a:endParaRPr lang="en-US">
-              <a:solidFill>
-                <a:srgbClr val="FF0000"/>
-              </a:solidFill>
-            </a:endParaRPr>
-          </a:p>
-        </p:txBody>
-      </p:sp>
-      <mc:AlternateContent xmlns:mc="http://schemas.openxmlformats.org/markup-compatibility/2006" xmlns:a14="http://schemas.microsoft.com/office/drawing/2010/main">
-        <mc:Choice Requires="a14">
+      <mc:AlternateContent xmlns:mc="http://schemas.openxmlformats.org/markup-compatibility/2006">
+        <mc:Choice xmlns:a14="http://schemas.microsoft.com/office/drawing/2010/main" Requires="a14">
           <p:sp>
             <p:nvSpPr>
-              <p:cNvPr id="39" name="TextBox 38">
+              <p:cNvPr id="160" name="TextBox 159">
                 <a:extLst>
                   <a:ext uri="{FF2B5EF4-FFF2-40B4-BE49-F238E27FC236}">
-                    <a16:creationId xmlns:a16="http://schemas.microsoft.com/office/drawing/2014/main" id="{8505FBBF-B62C-2141-AA25-81282F1993E6}"/>
+                    <a16:creationId xmlns:a16="http://schemas.microsoft.com/office/drawing/2014/main" id="{BEAFFAA6-1540-714A-8040-A8BA251A81E8}"/>
                   </a:ext>
                 </a:extLst>
               </p:cNvPr>
@@ -4128,8 +4036,8 @@
             </p:nvSpPr>
             <p:spPr>
               <a:xfrm>
-                <a:off x="3394609" y="4825981"/>
-                <a:ext cx="473143" cy="250453"/>
+                <a:off x="4942906" y="3415444"/>
+                <a:ext cx="315086" cy="277768"/>
               </a:xfrm>
               <a:prstGeom prst="rect">
                 <a:avLst/>
@@ -4159,7 +4067,7 @@
                         </m:sSubSupPr>
                         <m:e>
                           <m:r>
-                            <a:rPr lang="en-US" sz="1600" i="1">
+                            <a:rPr lang="en-US" sz="1600" b="0" i="1" smtClean="0">
                               <a:latin typeface="Cambria Math" panose="02040503050406030204" pitchFamily="18" charset="0"/>
                             </a:rPr>
                             <m:t>𝑢</m:t>
@@ -4170,311 +4078,10 @@
                             <a:rPr lang="en-US" sz="1600" b="0" i="1" smtClean="0">
                               <a:latin typeface="Cambria Math" panose="02040503050406030204" pitchFamily="18" charset="0"/>
                             </a:rPr>
-                            <m:t>𝐵</m:t>
-                          </m:r>
-                        </m:sub>
-                        <m:sup>
-                          <m:r>
-                            <a:rPr lang="en-US" sz="1600" b="0" i="1" smtClean="0">
-                              <a:latin typeface="Cambria Math" panose="02040503050406030204" pitchFamily="18" charset="0"/>
-                            </a:rPr>
-                            <m:t>𝑛</m:t>
-                          </m:r>
-                          <m:r>
-                            <a:rPr lang="en-US" sz="1600" b="0" i="1" smtClean="0">
-                              <a:latin typeface="Cambria Math" panose="02040503050406030204" pitchFamily="18" charset="0"/>
-                            </a:rPr>
-                            <m:t>+1</m:t>
-                          </m:r>
-                        </m:sup>
-                      </m:sSubSup>
-                    </m:oMath>
-                  </m:oMathPara>
-                </a14:m>
-                <a:endParaRPr lang="en-US" sz="1600" dirty="0"/>
-              </a:p>
-            </p:txBody>
-          </p:sp>
-        </mc:Choice>
-        <mc:Fallback xmlns="">
-          <p:sp>
-            <p:nvSpPr>
-              <p:cNvPr id="39" name="TextBox 38">
-                <a:extLst>
-                  <a:ext uri="{FF2B5EF4-FFF2-40B4-BE49-F238E27FC236}">
-                    <a16:creationId xmlns:a16="http://schemas.microsoft.com/office/drawing/2014/main" id="{8505FBBF-B62C-2141-AA25-81282F1993E6}"/>
-                  </a:ext>
-                </a:extLst>
-              </p:cNvPr>
-              <p:cNvSpPr txBox="1">
-                <a:spLocks noRot="1" noChangeAspect="1" noMove="1" noResize="1" noEditPoints="1" noAdjustHandles="1" noChangeArrowheads="1" noChangeShapeType="1" noTextEdit="1"/>
-              </p:cNvSpPr>
-              <p:nvPr/>
-            </p:nvSpPr>
-            <p:spPr>
-              <a:xfrm>
-                <a:off x="3394609" y="4825981"/>
-                <a:ext cx="473143" cy="250453"/>
-              </a:xfrm>
-              <a:prstGeom prst="rect">
-                <a:avLst/>
-              </a:prstGeom>
-              <a:blipFill>
-                <a:blip r:embed="rId7"/>
-                <a:stretch>
-                  <a:fillRect l="-5128" b="-9524"/>
-                </a:stretch>
-              </a:blipFill>
-            </p:spPr>
-            <p:txBody>
-              <a:bodyPr/>
-              <a:lstStyle/>
-              <a:p>
-                <a:r>
-                  <a:rPr lang="en-US">
-                    <a:noFill/>
-                  </a:rPr>
-                  <a:t> </a:t>
-                </a:r>
-              </a:p>
-            </p:txBody>
-          </p:sp>
-        </mc:Fallback>
-      </mc:AlternateContent>
-      <mc:AlternateContent xmlns:mc="http://schemas.openxmlformats.org/markup-compatibility/2006">
-        <mc:Choice xmlns:a14="http://schemas.microsoft.com/office/drawing/2010/main" Requires="a14">
-          <p:sp>
-            <p:nvSpPr>
-              <p:cNvPr id="153" name="TextBox 152">
-                <a:extLst>
-                  <a:ext uri="{FF2B5EF4-FFF2-40B4-BE49-F238E27FC236}">
-                    <a16:creationId xmlns:a16="http://schemas.microsoft.com/office/drawing/2014/main" id="{D3621B68-AB5E-FF4D-9874-A6298E59625F}"/>
-                  </a:ext>
-                </a:extLst>
-              </p:cNvPr>
-              <p:cNvSpPr txBox="1"/>
-              <p:nvPr/>
-            </p:nvSpPr>
-            <p:spPr>
-              <a:xfrm>
-                <a:off x="5688560" y="2722957"/>
-                <a:ext cx="473142" cy="246221"/>
-              </a:xfrm>
-              <a:prstGeom prst="rect">
-                <a:avLst/>
-              </a:prstGeom>
-              <a:noFill/>
-            </p:spPr>
-            <p:txBody>
-              <a:bodyPr wrap="none" lIns="0" tIns="0" rIns="0" bIns="0" rtlCol="0">
-                <a:spAutoFit/>
-              </a:bodyPr>
-              <a:lstStyle/>
-              <a:p>
-                <a:pPr/>
-                <a14:m>
-                  <m:oMathPara xmlns:m="http://schemas.openxmlformats.org/officeDocument/2006/math">
-                    <m:oMathParaPr>
-                      <m:jc m:val="centerGroup"/>
-                    </m:oMathParaPr>
-                    <m:oMath xmlns:m="http://schemas.openxmlformats.org/officeDocument/2006/math">
-                      <m:sSubSup>
-                        <m:sSubSupPr>
-                          <m:ctrlPr>
-                            <a:rPr lang="en-US" sz="1600" i="1" smtClean="0">
-                              <a:latin typeface="Cambria Math" panose="02040503050406030204" pitchFamily="18" charset="0"/>
-                            </a:rPr>
-                          </m:ctrlPr>
-                        </m:sSubSupPr>
-                        <m:e>
-                          <m:acc>
-                            <m:accPr>
-                              <m:chr m:val="̂"/>
-                              <m:ctrlPr>
-                                <a:rPr lang="en-US" sz="1600" i="1" smtClean="0">
-                                  <a:latin typeface="Cambria Math" panose="02040503050406030204" pitchFamily="18" charset="0"/>
-                                </a:rPr>
-                              </m:ctrlPr>
-                            </m:accPr>
-                            <m:e>
-                              <m:r>
-                                <a:rPr lang="en-US" sz="1600" b="0" i="1" smtClean="0">
-                                  <a:latin typeface="Cambria Math" panose="02040503050406030204" pitchFamily="18" charset="0"/>
-                                </a:rPr>
-                                <m:t>𝑢</m:t>
-                              </m:r>
-                            </m:e>
-                          </m:acc>
-                        </m:e>
-                        <m:sub>
-                          <m:r>
-                            <a:rPr lang="en-US" sz="1600" i="1">
-                              <a:latin typeface="Cambria Math" panose="02040503050406030204" pitchFamily="18" charset="0"/>
-                            </a:rPr>
-                            <m:t>𝑒</m:t>
-                          </m:r>
-                          <m:r>
-                            <a:rPr lang="en-US" sz="1600" b="0" i="1" smtClean="0">
-                              <a:latin typeface="Cambria Math" panose="02040503050406030204" pitchFamily="18" charset="0"/>
-                            </a:rPr>
-                            <m:t>𝑥</m:t>
-                          </m:r>
-                        </m:sub>
-                        <m:sup>
-                          <m:r>
-                            <a:rPr lang="en-US" sz="1600" i="1">
-                              <a:latin typeface="Cambria Math" panose="02040503050406030204" pitchFamily="18" charset="0"/>
-                            </a:rPr>
-                            <m:t>𝑛</m:t>
-                          </m:r>
-                          <m:r>
-                            <a:rPr lang="en-US" sz="1600" i="1">
-                              <a:latin typeface="Cambria Math" panose="02040503050406030204" pitchFamily="18" charset="0"/>
-                            </a:rPr>
-                            <m:t>+1</m:t>
-                          </m:r>
-                        </m:sup>
-                      </m:sSubSup>
-                    </m:oMath>
-                  </m:oMathPara>
-                </a14:m>
-                <a:endParaRPr lang="en-US" sz="1600" dirty="0"/>
-              </a:p>
-            </p:txBody>
-          </p:sp>
-        </mc:Choice>
-        <mc:Fallback>
-          <p:sp>
-            <p:nvSpPr>
-              <p:cNvPr id="153" name="TextBox 152">
-                <a:extLst>
-                  <a:ext uri="{FF2B5EF4-FFF2-40B4-BE49-F238E27FC236}">
-                    <a16:creationId xmlns:a16="http://schemas.microsoft.com/office/drawing/2014/main" id="{D3621B68-AB5E-FF4D-9874-A6298E59625F}"/>
-                  </a:ext>
-                </a:extLst>
-              </p:cNvPr>
-              <p:cNvSpPr txBox="1">
-                <a:spLocks noRot="1" noChangeAspect="1" noMove="1" noResize="1" noEditPoints="1" noAdjustHandles="1" noChangeArrowheads="1" noChangeShapeType="1" noTextEdit="1"/>
-              </p:cNvSpPr>
-              <p:nvPr/>
-            </p:nvSpPr>
-            <p:spPr>
-              <a:xfrm>
-                <a:off x="5688560" y="2722957"/>
-                <a:ext cx="473142" cy="246221"/>
-              </a:xfrm>
-              <a:prstGeom prst="rect">
-                <a:avLst/>
-              </a:prstGeom>
-              <a:blipFill>
-                <a:blip r:embed="rId8"/>
-                <a:stretch>
-                  <a:fillRect l="-5263" t="-9524" r="-2632" b="-4762"/>
-                </a:stretch>
-              </a:blipFill>
-            </p:spPr>
-            <p:txBody>
-              <a:bodyPr/>
-              <a:lstStyle/>
-              <a:p>
-                <a:r>
-                  <a:rPr lang="en-US">
-                    <a:noFill/>
-                  </a:rPr>
-                  <a:t> </a:t>
-                </a:r>
-              </a:p>
-            </p:txBody>
-          </p:sp>
-        </mc:Fallback>
-      </mc:AlternateContent>
-      <mc:AlternateContent xmlns:mc="http://schemas.openxmlformats.org/markup-compatibility/2006">
-        <mc:Choice xmlns:a14="http://schemas.microsoft.com/office/drawing/2010/main" Requires="a14">
-          <p:sp>
-            <p:nvSpPr>
-              <p:cNvPr id="160" name="TextBox 159">
-                <a:extLst>
-                  <a:ext uri="{FF2B5EF4-FFF2-40B4-BE49-F238E27FC236}">
-                    <a16:creationId xmlns:a16="http://schemas.microsoft.com/office/drawing/2014/main" id="{BEAFFAA6-1540-714A-8040-A8BA251A81E8}"/>
-                  </a:ext>
-                </a:extLst>
-              </p:cNvPr>
-              <p:cNvSpPr txBox="1"/>
-              <p:nvPr/>
-            </p:nvSpPr>
-            <p:spPr>
-              <a:xfrm>
-                <a:off x="4334121" y="4244431"/>
-                <a:ext cx="473142" cy="256737"/>
-              </a:xfrm>
-              <a:prstGeom prst="rect">
-                <a:avLst/>
-              </a:prstGeom>
-              <a:noFill/>
-            </p:spPr>
-            <p:txBody>
-              <a:bodyPr wrap="none" lIns="0" tIns="0" rIns="0" bIns="0" rtlCol="0">
-                <a:spAutoFit/>
-              </a:bodyPr>
-              <a:lstStyle/>
-              <a:p>
-                <a:pPr/>
-                <a14:m>
-                  <m:oMathPara xmlns:m="http://schemas.openxmlformats.org/officeDocument/2006/math">
-                    <m:oMathParaPr>
-                      <m:jc m:val="centerGroup"/>
-                    </m:oMathParaPr>
-                    <m:oMath xmlns:m="http://schemas.openxmlformats.org/officeDocument/2006/math">
-                      <m:sSubSup>
-                        <m:sSubSupPr>
-                          <m:ctrlPr>
-                            <a:rPr lang="en-US" sz="1600" b="0" i="1" smtClean="0">
-                              <a:latin typeface="Cambria Math" panose="02040503050406030204" pitchFamily="18" charset="0"/>
-                            </a:rPr>
-                          </m:ctrlPr>
-                        </m:sSubSupPr>
-                        <m:e>
-                          <m:acc>
-                            <m:accPr>
-                              <m:chr m:val="̂"/>
-                              <m:ctrlPr>
-                                <a:rPr lang="en-US" sz="1600" b="0" i="1" smtClean="0">
-                                  <a:latin typeface="Cambria Math" panose="02040503050406030204" pitchFamily="18" charset="0"/>
-                                </a:rPr>
-                              </m:ctrlPr>
-                            </m:accPr>
-                            <m:e>
-                              <m:r>
-                                <a:rPr lang="en-US" sz="1600" b="0" i="1" smtClean="0">
-                                  <a:latin typeface="Cambria Math" panose="02040503050406030204" pitchFamily="18" charset="0"/>
-                                </a:rPr>
-                                <m:t>𝑢</m:t>
-                              </m:r>
-                            </m:e>
-                          </m:acc>
-                        </m:e>
-                        <m:sub>
-                          <m:r>
-                            <a:rPr lang="en-US" sz="1600" b="0" i="1" smtClean="0">
-                              <a:latin typeface="Cambria Math" panose="02040503050406030204" pitchFamily="18" charset="0"/>
-                            </a:rPr>
                             <m:t>𝑑</m:t>
                           </m:r>
                         </m:sub>
-                        <m:sup>
-                          <m:r>
-                            <a:rPr lang="en-US" sz="1600" b="0" i="1" smtClean="0">
-                              <a:latin typeface="Cambria Math" panose="02040503050406030204" pitchFamily="18" charset="0"/>
-                            </a:rPr>
-                            <m:t>𝑛</m:t>
-                          </m:r>
-                          <m:r>
-                            <a:rPr lang="en-US" sz="1600" b="0" i="1" smtClean="0">
-                              <a:latin typeface="Cambria Math" panose="02040503050406030204" pitchFamily="18" charset="0"/>
-                            </a:rPr>
-                            <m:t>+1</m:t>
-                          </m:r>
-                        </m:sup>
+                        <m:sup/>
                       </m:sSubSup>
                     </m:oMath>
                   </m:oMathPara>
@@ -4501,16 +4108,16 @@
             </p:nvSpPr>
             <p:spPr>
               <a:xfrm>
-                <a:off x="4334121" y="4244431"/>
-                <a:ext cx="473142" cy="256737"/>
+                <a:off x="4942906" y="3415444"/>
+                <a:ext cx="315086" cy="277768"/>
               </a:xfrm>
               <a:prstGeom prst="rect">
                 <a:avLst/>
               </a:prstGeom>
               <a:blipFill>
-                <a:blip r:embed="rId9"/>
+                <a:blip r:embed="rId7"/>
                 <a:stretch>
-                  <a:fillRect l="-5128" t="-4762" b="-19048"/>
+                  <a:fillRect l="-11538" b="-17391"/>
                 </a:stretch>
               </a:blipFill>
             </p:spPr>
@@ -4533,747 +4140,6 @@
         <mc:Choice xmlns:a14="http://schemas.microsoft.com/office/drawing/2010/main" Requires="a14">
           <p:sp>
             <p:nvSpPr>
-              <p:cNvPr id="165" name="TextBox 164">
-                <a:extLst>
-                  <a:ext uri="{FF2B5EF4-FFF2-40B4-BE49-F238E27FC236}">
-                    <a16:creationId xmlns:a16="http://schemas.microsoft.com/office/drawing/2014/main" id="{6F9FDF16-0E14-FC42-88D8-EA9A14BD549C}"/>
-                  </a:ext>
-                </a:extLst>
-              </p:cNvPr>
-              <p:cNvSpPr txBox="1"/>
-              <p:nvPr/>
-            </p:nvSpPr>
-            <p:spPr>
-              <a:xfrm>
-                <a:off x="5709765" y="3266504"/>
-                <a:ext cx="473142" cy="249812"/>
-              </a:xfrm>
-              <a:prstGeom prst="rect">
-                <a:avLst/>
-              </a:prstGeom>
-              <a:noFill/>
-            </p:spPr>
-            <p:txBody>
-              <a:bodyPr wrap="none" lIns="0" tIns="0" rIns="0" bIns="0" rtlCol="0">
-                <a:spAutoFit/>
-              </a:bodyPr>
-              <a:lstStyle/>
-              <a:p>
-                <a:pPr/>
-                <a14:m>
-                  <m:oMathPara xmlns:m="http://schemas.openxmlformats.org/officeDocument/2006/math">
-                    <m:oMathParaPr>
-                      <m:jc m:val="centerGroup"/>
-                    </m:oMathParaPr>
-                    <m:oMath xmlns:m="http://schemas.openxmlformats.org/officeDocument/2006/math">
-                      <m:sSubSup>
-                        <m:sSubSupPr>
-                          <m:ctrlPr>
-                            <a:rPr lang="en-US" sz="1600" i="1" smtClean="0">
-                              <a:latin typeface="Cambria Math" panose="02040503050406030204" pitchFamily="18" charset="0"/>
-                            </a:rPr>
-                          </m:ctrlPr>
-                        </m:sSubSupPr>
-                        <m:e>
-                          <m:acc>
-                            <m:accPr>
-                              <m:chr m:val="̂"/>
-                              <m:ctrlPr>
-                                <a:rPr lang="en-US" sz="1600" i="1" smtClean="0">
-                                  <a:latin typeface="Cambria Math" panose="02040503050406030204" pitchFamily="18" charset="0"/>
-                                </a:rPr>
-                              </m:ctrlPr>
-                            </m:accPr>
-                            <m:e>
-                              <m:r>
-                                <a:rPr lang="en-US" sz="1600" b="0" i="1" smtClean="0">
-                                  <a:latin typeface="Cambria Math" panose="02040503050406030204" pitchFamily="18" charset="0"/>
-                                </a:rPr>
-                                <m:t>𝑢</m:t>
-                              </m:r>
-                            </m:e>
-                          </m:acc>
-                        </m:e>
-                        <m:sub>
-                          <m:r>
-                            <a:rPr lang="en-US" sz="1600" b="0" i="1" smtClean="0">
-                              <a:latin typeface="Cambria Math" panose="02040503050406030204" pitchFamily="18" charset="0"/>
-                            </a:rPr>
-                            <m:t>1</m:t>
-                          </m:r>
-                        </m:sub>
-                        <m:sup>
-                          <m:r>
-                            <a:rPr lang="en-US" sz="1600" i="1">
-                              <a:latin typeface="Cambria Math" panose="02040503050406030204" pitchFamily="18" charset="0"/>
-                            </a:rPr>
-                            <m:t>𝑛</m:t>
-                          </m:r>
-                          <m:r>
-                            <a:rPr lang="en-US" sz="1600" i="1">
-                              <a:latin typeface="Cambria Math" panose="02040503050406030204" pitchFamily="18" charset="0"/>
-                            </a:rPr>
-                            <m:t>+1</m:t>
-                          </m:r>
-                        </m:sup>
-                      </m:sSubSup>
-                    </m:oMath>
-                  </m:oMathPara>
-                </a14:m>
-                <a:endParaRPr lang="en-US" sz="1600" dirty="0"/>
-              </a:p>
-            </p:txBody>
-          </p:sp>
-        </mc:Choice>
-        <mc:Fallback>
-          <p:sp>
-            <p:nvSpPr>
-              <p:cNvPr id="165" name="TextBox 164">
-                <a:extLst>
-                  <a:ext uri="{FF2B5EF4-FFF2-40B4-BE49-F238E27FC236}">
-                    <a16:creationId xmlns:a16="http://schemas.microsoft.com/office/drawing/2014/main" id="{6F9FDF16-0E14-FC42-88D8-EA9A14BD549C}"/>
-                  </a:ext>
-                </a:extLst>
-              </p:cNvPr>
-              <p:cNvSpPr txBox="1">
-                <a:spLocks noRot="1" noChangeAspect="1" noMove="1" noResize="1" noEditPoints="1" noAdjustHandles="1" noChangeArrowheads="1" noChangeShapeType="1" noTextEdit="1"/>
-              </p:cNvSpPr>
-              <p:nvPr/>
-            </p:nvSpPr>
-            <p:spPr>
-              <a:xfrm>
-                <a:off x="5709765" y="3266504"/>
-                <a:ext cx="473142" cy="249812"/>
-              </a:xfrm>
-              <a:prstGeom prst="rect">
-                <a:avLst/>
-              </a:prstGeom>
-              <a:blipFill>
-                <a:blip r:embed="rId10"/>
-                <a:stretch>
-                  <a:fillRect l="-7895" t="-14286" r="-2632" b="-9524"/>
-                </a:stretch>
-              </a:blipFill>
-            </p:spPr>
-            <p:txBody>
-              <a:bodyPr/>
-              <a:lstStyle/>
-              <a:p>
-                <a:r>
-                  <a:rPr lang="en-US">
-                    <a:noFill/>
-                  </a:rPr>
-                  <a:t> </a:t>
-                </a:r>
-              </a:p>
-            </p:txBody>
-          </p:sp>
-        </mc:Fallback>
-      </mc:AlternateContent>
-      <mc:AlternateContent xmlns:mc="http://schemas.openxmlformats.org/markup-compatibility/2006">
-        <mc:Choice xmlns:a14="http://schemas.microsoft.com/office/drawing/2010/main" Requires="a14">
-          <p:sp>
-            <p:nvSpPr>
-              <p:cNvPr id="166" name="TextBox 165">
-                <a:extLst>
-                  <a:ext uri="{FF2B5EF4-FFF2-40B4-BE49-F238E27FC236}">
-                    <a16:creationId xmlns:a16="http://schemas.microsoft.com/office/drawing/2014/main" id="{F273A2F5-3DF2-4646-9770-571EDCCE0579}"/>
-                  </a:ext>
-                </a:extLst>
-              </p:cNvPr>
-              <p:cNvSpPr txBox="1"/>
-              <p:nvPr/>
-            </p:nvSpPr>
-            <p:spPr>
-              <a:xfrm>
-                <a:off x="5677724" y="1442105"/>
-                <a:ext cx="473142" cy="250325"/>
-              </a:xfrm>
-              <a:prstGeom prst="rect">
-                <a:avLst/>
-              </a:prstGeom>
-              <a:noFill/>
-            </p:spPr>
-            <p:txBody>
-              <a:bodyPr wrap="none" lIns="0" tIns="0" rIns="0" bIns="0" rtlCol="0">
-                <a:spAutoFit/>
-              </a:bodyPr>
-              <a:lstStyle/>
-              <a:p>
-                <a:pPr/>
-                <a14:m>
-                  <m:oMathPara xmlns:m="http://schemas.openxmlformats.org/officeDocument/2006/math">
-                    <m:oMathParaPr>
-                      <m:jc m:val="centerGroup"/>
-                    </m:oMathParaPr>
-                    <m:oMath xmlns:m="http://schemas.openxmlformats.org/officeDocument/2006/math">
-                      <m:sSubSup>
-                        <m:sSubSupPr>
-                          <m:ctrlPr>
-                            <a:rPr lang="en-US" sz="1600" i="1" smtClean="0">
-                              <a:latin typeface="Cambria Math" panose="02040503050406030204" pitchFamily="18" charset="0"/>
-                            </a:rPr>
-                          </m:ctrlPr>
-                        </m:sSubSupPr>
-                        <m:e>
-                          <m:acc>
-                            <m:accPr>
-                              <m:chr m:val="̂"/>
-                              <m:ctrlPr>
-                                <a:rPr lang="en-US" sz="1600" i="1" smtClean="0">
-                                  <a:latin typeface="Cambria Math" panose="02040503050406030204" pitchFamily="18" charset="0"/>
-                                </a:rPr>
-                              </m:ctrlPr>
-                            </m:accPr>
-                            <m:e>
-                              <m:r>
-                                <a:rPr lang="en-US" sz="1600" b="0" i="1" smtClean="0">
-                                  <a:latin typeface="Cambria Math" panose="02040503050406030204" pitchFamily="18" charset="0"/>
-                                </a:rPr>
-                                <m:t>𝑢</m:t>
-                              </m:r>
-                            </m:e>
-                          </m:acc>
-                        </m:e>
-                        <m:sub>
-                          <m:r>
-                            <a:rPr lang="en-US" sz="1600" b="0" i="1" smtClean="0">
-                              <a:latin typeface="Cambria Math" panose="02040503050406030204" pitchFamily="18" charset="0"/>
-                            </a:rPr>
-                            <m:t>2</m:t>
-                          </m:r>
-                        </m:sub>
-                        <m:sup>
-                          <m:r>
-                            <a:rPr lang="en-US" sz="1600" i="1">
-                              <a:latin typeface="Cambria Math" panose="02040503050406030204" pitchFamily="18" charset="0"/>
-                            </a:rPr>
-                            <m:t>𝑛</m:t>
-                          </m:r>
-                          <m:r>
-                            <a:rPr lang="en-US" sz="1600" i="1">
-                              <a:latin typeface="Cambria Math" panose="02040503050406030204" pitchFamily="18" charset="0"/>
-                            </a:rPr>
-                            <m:t>+1</m:t>
-                          </m:r>
-                        </m:sup>
-                      </m:sSubSup>
-                    </m:oMath>
-                  </m:oMathPara>
-                </a14:m>
-                <a:endParaRPr lang="en-US" sz="1600" dirty="0"/>
-              </a:p>
-            </p:txBody>
-          </p:sp>
-        </mc:Choice>
-        <mc:Fallback>
-          <p:sp>
-            <p:nvSpPr>
-              <p:cNvPr id="166" name="TextBox 165">
-                <a:extLst>
-                  <a:ext uri="{FF2B5EF4-FFF2-40B4-BE49-F238E27FC236}">
-                    <a16:creationId xmlns:a16="http://schemas.microsoft.com/office/drawing/2014/main" id="{F273A2F5-3DF2-4646-9770-571EDCCE0579}"/>
-                  </a:ext>
-                </a:extLst>
-              </p:cNvPr>
-              <p:cNvSpPr txBox="1">
-                <a:spLocks noRot="1" noChangeAspect="1" noMove="1" noResize="1" noEditPoints="1" noAdjustHandles="1" noChangeArrowheads="1" noChangeShapeType="1" noTextEdit="1"/>
-              </p:cNvSpPr>
-              <p:nvPr/>
-            </p:nvSpPr>
-            <p:spPr>
-              <a:xfrm>
-                <a:off x="5677724" y="1442105"/>
-                <a:ext cx="473142" cy="250325"/>
-              </a:xfrm>
-              <a:prstGeom prst="rect">
-                <a:avLst/>
-              </a:prstGeom>
-              <a:blipFill>
-                <a:blip r:embed="rId11"/>
-                <a:stretch>
-                  <a:fillRect l="-5263" t="-15000" r="-2632" b="-10000"/>
-                </a:stretch>
-              </a:blipFill>
-            </p:spPr>
-            <p:txBody>
-              <a:bodyPr/>
-              <a:lstStyle/>
-              <a:p>
-                <a:r>
-                  <a:rPr lang="en-US">
-                    <a:noFill/>
-                  </a:rPr>
-                  <a:t> </a:t>
-                </a:r>
-              </a:p>
-            </p:txBody>
-          </p:sp>
-        </mc:Fallback>
-      </mc:AlternateContent>
-      <p:cxnSp>
-        <p:nvCxnSpPr>
-          <p:cNvPr id="170" name="Straight Connector 169">
-            <a:extLst>
-              <a:ext uri="{FF2B5EF4-FFF2-40B4-BE49-F238E27FC236}">
-                <a16:creationId xmlns:a16="http://schemas.microsoft.com/office/drawing/2014/main" id="{17467359-288F-014D-8F34-02CF03533C20}"/>
-              </a:ext>
-            </a:extLst>
-          </p:cNvPr>
-          <p:cNvCxnSpPr>
-            <a:cxnSpLocks/>
-          </p:cNvCxnSpPr>
-          <p:nvPr/>
-        </p:nvCxnSpPr>
-        <p:spPr>
-          <a:xfrm flipV="1">
-            <a:off x="5642821" y="1794128"/>
-            <a:ext cx="0" cy="1418979"/>
-          </a:xfrm>
-          <a:prstGeom prst="line">
-            <a:avLst/>
-          </a:prstGeom>
-          <a:ln w="38100">
-            <a:solidFill>
-              <a:schemeClr val="accent1">
-                <a:lumMod val="75000"/>
-              </a:schemeClr>
-            </a:solidFill>
-            <a:prstDash val="solid"/>
-          </a:ln>
-        </p:spPr>
-        <p:style>
-          <a:lnRef idx="2">
-            <a:schemeClr val="accent1"/>
-          </a:lnRef>
-          <a:fillRef idx="0">
-            <a:schemeClr val="accent1"/>
-          </a:fillRef>
-          <a:effectRef idx="1">
-            <a:schemeClr val="accent1"/>
-          </a:effectRef>
-          <a:fontRef idx="minor">
-            <a:schemeClr val="tx1"/>
-          </a:fontRef>
-        </p:style>
-      </p:cxnSp>
-      <p:sp>
-        <p:nvSpPr>
-          <p:cNvPr id="145" name="Oval 144">
-            <a:extLst>
-              <a:ext uri="{FF2B5EF4-FFF2-40B4-BE49-F238E27FC236}">
-                <a16:creationId xmlns:a16="http://schemas.microsoft.com/office/drawing/2014/main" id="{FBD61D27-495A-AC4C-918E-6852217A0848}"/>
-              </a:ext>
-            </a:extLst>
-          </p:cNvPr>
-          <p:cNvSpPr/>
-          <p:nvPr/>
-        </p:nvSpPr>
-        <p:spPr>
-          <a:xfrm>
-            <a:off x="5613917" y="2767872"/>
-            <a:ext cx="61136" cy="58709"/>
-          </a:xfrm>
-          <a:prstGeom prst="ellipse">
-            <a:avLst/>
-          </a:prstGeom>
-        </p:spPr>
-        <p:style>
-          <a:lnRef idx="1">
-            <a:schemeClr val="dk1"/>
-          </a:lnRef>
-          <a:fillRef idx="3">
-            <a:schemeClr val="dk1"/>
-          </a:fillRef>
-          <a:effectRef idx="2">
-            <a:schemeClr val="dk1"/>
-          </a:effectRef>
-          <a:fontRef idx="minor">
-            <a:schemeClr val="lt1"/>
-          </a:fontRef>
-        </p:style>
-        <p:txBody>
-          <a:bodyPr rtlCol="0" anchor="ctr"/>
-          <a:lstStyle/>
-          <a:p>
-            <a:pPr algn="ctr"/>
-            <a:endParaRPr lang="en-US">
-              <a:solidFill>
-                <a:srgbClr val="FF0000"/>
-              </a:solidFill>
-            </a:endParaRPr>
-          </a:p>
-        </p:txBody>
-      </p:sp>
-      <p:cxnSp>
-        <p:nvCxnSpPr>
-          <p:cNvPr id="188" name="Straight Connector 187">
-            <a:extLst>
-              <a:ext uri="{FF2B5EF4-FFF2-40B4-BE49-F238E27FC236}">
-                <a16:creationId xmlns:a16="http://schemas.microsoft.com/office/drawing/2014/main" id="{F605BF23-4D44-4C4E-ABCD-E3AE5D07ABB7}"/>
-              </a:ext>
-            </a:extLst>
-          </p:cNvPr>
-          <p:cNvCxnSpPr>
-            <a:cxnSpLocks/>
-          </p:cNvCxnSpPr>
-          <p:nvPr/>
-        </p:nvCxnSpPr>
-        <p:spPr>
-          <a:xfrm flipV="1">
-            <a:off x="7170062" y="862522"/>
-            <a:ext cx="0" cy="4783250"/>
-          </a:xfrm>
-          <a:prstGeom prst="line">
-            <a:avLst/>
-          </a:prstGeom>
-        </p:spPr>
-        <p:style>
-          <a:lnRef idx="2">
-            <a:schemeClr val="accent1"/>
-          </a:lnRef>
-          <a:fillRef idx="0">
-            <a:schemeClr val="accent1"/>
-          </a:fillRef>
-          <a:effectRef idx="1">
-            <a:schemeClr val="accent1"/>
-          </a:effectRef>
-          <a:fontRef idx="minor">
-            <a:schemeClr val="tx1"/>
-          </a:fontRef>
-        </p:style>
-      </p:cxnSp>
-      <p:cxnSp>
-        <p:nvCxnSpPr>
-          <p:cNvPr id="192" name="Straight Connector 191">
-            <a:extLst>
-              <a:ext uri="{FF2B5EF4-FFF2-40B4-BE49-F238E27FC236}">
-                <a16:creationId xmlns:a16="http://schemas.microsoft.com/office/drawing/2014/main" id="{6D064777-1E8B-8642-BAC2-3544CDB60988}"/>
-              </a:ext>
-            </a:extLst>
-          </p:cNvPr>
-          <p:cNvCxnSpPr>
-            <a:cxnSpLocks/>
-          </p:cNvCxnSpPr>
-          <p:nvPr/>
-        </p:nvCxnSpPr>
-        <p:spPr>
-          <a:xfrm flipH="1">
-            <a:off x="2085191" y="1154982"/>
-            <a:ext cx="5405107" cy="38053"/>
-          </a:xfrm>
-          <a:prstGeom prst="line">
-            <a:avLst/>
-          </a:prstGeom>
-        </p:spPr>
-        <p:style>
-          <a:lnRef idx="2">
-            <a:schemeClr val="accent1"/>
-          </a:lnRef>
-          <a:fillRef idx="0">
-            <a:schemeClr val="accent1"/>
-          </a:fillRef>
-          <a:effectRef idx="1">
-            <a:schemeClr val="accent1"/>
-          </a:effectRef>
-          <a:fontRef idx="minor">
-            <a:schemeClr val="tx1"/>
-          </a:fontRef>
-        </p:style>
-      </p:cxnSp>
-      <p:cxnSp>
-        <p:nvCxnSpPr>
-          <p:cNvPr id="123" name="Straight Connector 122">
-            <a:extLst>
-              <a:ext uri="{FF2B5EF4-FFF2-40B4-BE49-F238E27FC236}">
-                <a16:creationId xmlns:a16="http://schemas.microsoft.com/office/drawing/2014/main" id="{68AD8DC7-C033-8240-958B-899544A1663A}"/>
-              </a:ext>
-            </a:extLst>
-          </p:cNvPr>
-          <p:cNvCxnSpPr/>
-          <p:nvPr/>
-        </p:nvCxnSpPr>
-        <p:spPr>
-          <a:xfrm>
-            <a:off x="5499190" y="3211021"/>
-            <a:ext cx="394723" cy="0"/>
-          </a:xfrm>
-          <a:prstGeom prst="line">
-            <a:avLst/>
-          </a:prstGeom>
-          <a:ln w="38100" cmpd="sng">
-            <a:solidFill>
-              <a:schemeClr val="tx2">
-                <a:lumMod val="60000"/>
-                <a:lumOff val="40000"/>
-              </a:schemeClr>
-            </a:solidFill>
-            <a:headEnd type="none" w="sm" len="lg"/>
-            <a:tailEnd type="triangle" w="sm" len="lg"/>
-          </a:ln>
-        </p:spPr>
-        <p:style>
-          <a:lnRef idx="2">
-            <a:schemeClr val="accent1"/>
-          </a:lnRef>
-          <a:fillRef idx="0">
-            <a:schemeClr val="accent1"/>
-          </a:fillRef>
-          <a:effectRef idx="1">
-            <a:schemeClr val="accent1"/>
-          </a:effectRef>
-          <a:fontRef idx="minor">
-            <a:schemeClr val="tx1"/>
-          </a:fontRef>
-        </p:style>
-      </p:cxnSp>
-      <p:cxnSp>
-        <p:nvCxnSpPr>
-          <p:cNvPr id="115" name="Straight Connector 114">
-            <a:extLst>
-              <a:ext uri="{FF2B5EF4-FFF2-40B4-BE49-F238E27FC236}">
-                <a16:creationId xmlns:a16="http://schemas.microsoft.com/office/drawing/2014/main" id="{2CC781D3-B335-0647-B405-150719A6DF9A}"/>
-              </a:ext>
-            </a:extLst>
-          </p:cNvPr>
-          <p:cNvCxnSpPr/>
-          <p:nvPr/>
-        </p:nvCxnSpPr>
-        <p:spPr>
-          <a:xfrm>
-            <a:off x="5487835" y="1794128"/>
-            <a:ext cx="394723" cy="0"/>
-          </a:xfrm>
-          <a:prstGeom prst="line">
-            <a:avLst/>
-          </a:prstGeom>
-          <a:ln w="38100" cmpd="sng">
-            <a:solidFill>
-              <a:schemeClr val="tx2">
-                <a:lumMod val="60000"/>
-                <a:lumOff val="40000"/>
-              </a:schemeClr>
-            </a:solidFill>
-            <a:headEnd type="none" w="sm" len="lg"/>
-            <a:tailEnd type="triangle" w="sm" len="lg"/>
-          </a:ln>
-        </p:spPr>
-        <p:style>
-          <a:lnRef idx="2">
-            <a:schemeClr val="accent1"/>
-          </a:lnRef>
-          <a:fillRef idx="0">
-            <a:schemeClr val="accent1"/>
-          </a:fillRef>
-          <a:effectRef idx="1">
-            <a:schemeClr val="accent1"/>
-          </a:effectRef>
-          <a:fontRef idx="minor">
-            <a:schemeClr val="tx1"/>
-          </a:fontRef>
-        </p:style>
-      </p:cxnSp>
-      <p:cxnSp>
-        <p:nvCxnSpPr>
-          <p:cNvPr id="193" name="Straight Connector 192">
-            <a:extLst>
-              <a:ext uri="{FF2B5EF4-FFF2-40B4-BE49-F238E27FC236}">
-                <a16:creationId xmlns:a16="http://schemas.microsoft.com/office/drawing/2014/main" id="{F91C8C5E-5A6D-A54C-AE0C-52CB27467508}"/>
-              </a:ext>
-            </a:extLst>
-          </p:cNvPr>
-          <p:cNvCxnSpPr>
-            <a:cxnSpLocks/>
-          </p:cNvCxnSpPr>
-          <p:nvPr/>
-        </p:nvCxnSpPr>
-        <p:spPr>
-          <a:xfrm flipV="1">
-            <a:off x="5681844" y="1848255"/>
-            <a:ext cx="982079" cy="913134"/>
-          </a:xfrm>
-          <a:prstGeom prst="line">
-            <a:avLst/>
-          </a:prstGeom>
-          <a:ln w="9525">
-            <a:solidFill>
-              <a:schemeClr val="tx1"/>
-            </a:solidFill>
-            <a:prstDash val="dash"/>
-            <a:tailEnd type="triangle"/>
-          </a:ln>
-        </p:spPr>
-        <p:style>
-          <a:lnRef idx="2">
-            <a:schemeClr val="accent1"/>
-          </a:lnRef>
-          <a:fillRef idx="0">
-            <a:schemeClr val="accent1"/>
-          </a:fillRef>
-          <a:effectRef idx="1">
-            <a:schemeClr val="accent1"/>
-          </a:effectRef>
-          <a:fontRef idx="minor">
-            <a:schemeClr val="tx1"/>
-          </a:fontRef>
-        </p:style>
-      </p:cxnSp>
-      <p:cxnSp>
-        <p:nvCxnSpPr>
-          <p:cNvPr id="194" name="Straight Arrow Connector 193">
-            <a:extLst>
-              <a:ext uri="{FF2B5EF4-FFF2-40B4-BE49-F238E27FC236}">
-                <a16:creationId xmlns:a16="http://schemas.microsoft.com/office/drawing/2014/main" id="{23C79679-F8D5-3946-B9B4-3AF1A351BA67}"/>
-              </a:ext>
-            </a:extLst>
-          </p:cNvPr>
-          <p:cNvCxnSpPr>
-            <a:cxnSpLocks/>
-          </p:cNvCxnSpPr>
-          <p:nvPr/>
-        </p:nvCxnSpPr>
-        <p:spPr>
-          <a:xfrm flipV="1">
-            <a:off x="6102485" y="2069990"/>
-            <a:ext cx="327300" cy="297074"/>
-          </a:xfrm>
-          <a:prstGeom prst="straightConnector1">
-            <a:avLst/>
-          </a:prstGeom>
-          <a:ln w="31750" cmpd="sng">
-            <a:solidFill>
-              <a:srgbClr val="953735"/>
-            </a:solidFill>
-            <a:tailEnd type="triangle" w="sm" len="lg"/>
-          </a:ln>
-        </p:spPr>
-        <p:style>
-          <a:lnRef idx="2">
-            <a:schemeClr val="accent1"/>
-          </a:lnRef>
-          <a:fillRef idx="0">
-            <a:schemeClr val="accent1"/>
-          </a:fillRef>
-          <a:effectRef idx="1">
-            <a:schemeClr val="accent1"/>
-          </a:effectRef>
-          <a:fontRef idx="minor">
-            <a:schemeClr val="tx1"/>
-          </a:fontRef>
-        </p:style>
-      </p:cxnSp>
-      <mc:AlternateContent xmlns:mc="http://schemas.openxmlformats.org/markup-compatibility/2006" xmlns:a14="http://schemas.microsoft.com/office/drawing/2010/main">
-        <mc:Choice Requires="a14">
-          <p:sp>
-            <p:nvSpPr>
-              <p:cNvPr id="78" name="TextBox 77">
-                <a:extLst>
-                  <a:ext uri="{FF2B5EF4-FFF2-40B4-BE49-F238E27FC236}">
-                    <a16:creationId xmlns:a16="http://schemas.microsoft.com/office/drawing/2014/main" id="{68451BC6-502B-2C42-9540-31F8DF6BE4EE}"/>
-                  </a:ext>
-                </a:extLst>
-              </p:cNvPr>
-              <p:cNvSpPr txBox="1"/>
-              <p:nvPr/>
-            </p:nvSpPr>
-            <p:spPr>
-              <a:xfrm>
-                <a:off x="6287115" y="2223071"/>
-                <a:ext cx="166854" cy="246221"/>
-              </a:xfrm>
-              <a:prstGeom prst="rect">
-                <a:avLst/>
-              </a:prstGeom>
-              <a:noFill/>
-            </p:spPr>
-            <p:txBody>
-              <a:bodyPr wrap="square" lIns="0" tIns="0" rIns="0" bIns="0" rtlCol="0">
-                <a:spAutoFit/>
-              </a:bodyPr>
-              <a:lstStyle/>
-              <a:p>
-                <a:pPr/>
-                <a14:m>
-                  <m:oMathPara xmlns:m="http://schemas.openxmlformats.org/officeDocument/2006/math">
-                    <m:oMathParaPr>
-                      <m:jc m:val="centerGroup"/>
-                    </m:oMathParaPr>
-                    <m:oMath xmlns:m="http://schemas.openxmlformats.org/officeDocument/2006/math">
-                      <m:acc>
-                        <m:accPr>
-                          <m:chr m:val="̂"/>
-                          <m:ctrlPr>
-                            <a:rPr lang="en-US" sz="1600" b="1" i="1" smtClean="0">
-                              <a:latin typeface="Cambria Math" panose="02040503050406030204" pitchFamily="18" charset="0"/>
-                            </a:rPr>
-                          </m:ctrlPr>
-                        </m:accPr>
-                        <m:e>
-                          <m:r>
-                            <a:rPr lang="en-US" sz="1600" b="1" i="1" smtClean="0">
-                              <a:latin typeface="Cambria Math" panose="02040503050406030204" pitchFamily="18" charset="0"/>
-                            </a:rPr>
-                            <m:t>𝒏</m:t>
-                          </m:r>
-                        </m:e>
-                      </m:acc>
-                    </m:oMath>
-                  </m:oMathPara>
-                </a14:m>
-                <a:endParaRPr lang="en-US" sz="1600" b="1" dirty="0"/>
-              </a:p>
-            </p:txBody>
-          </p:sp>
-        </mc:Choice>
-        <mc:Fallback xmlns="">
-          <p:sp>
-            <p:nvSpPr>
-              <p:cNvPr id="78" name="TextBox 77">
-                <a:extLst>
-                  <a:ext uri="{FF2B5EF4-FFF2-40B4-BE49-F238E27FC236}">
-                    <a16:creationId xmlns:a16="http://schemas.microsoft.com/office/drawing/2014/main" id="{68451BC6-502B-2C42-9540-31F8DF6BE4EE}"/>
-                  </a:ext>
-                </a:extLst>
-              </p:cNvPr>
-              <p:cNvSpPr txBox="1">
-                <a:spLocks noRot="1" noChangeAspect="1" noMove="1" noResize="1" noEditPoints="1" noAdjustHandles="1" noChangeArrowheads="1" noChangeShapeType="1" noTextEdit="1"/>
-              </p:cNvSpPr>
-              <p:nvPr/>
-            </p:nvSpPr>
-            <p:spPr>
-              <a:xfrm>
-                <a:off x="6287115" y="2223071"/>
-                <a:ext cx="166854" cy="246221"/>
-              </a:xfrm>
-              <a:prstGeom prst="rect">
-                <a:avLst/>
-              </a:prstGeom>
-              <a:blipFill>
-                <a:blip r:embed="rId12"/>
-                <a:stretch>
-                  <a:fillRect l="-21429" t="-15000" r="-21429"/>
-                </a:stretch>
-              </a:blipFill>
-            </p:spPr>
-            <p:txBody>
-              <a:bodyPr/>
-              <a:lstStyle/>
-              <a:p>
-                <a:r>
-                  <a:rPr lang="en-US">
-                    <a:noFill/>
-                  </a:rPr>
-                  <a:t> </a:t>
-                </a:r>
-              </a:p>
-            </p:txBody>
-          </p:sp>
-        </mc:Fallback>
-      </mc:AlternateContent>
-      <mc:AlternateContent xmlns:mc="http://schemas.openxmlformats.org/markup-compatibility/2006" xmlns:a14="http://schemas.microsoft.com/office/drawing/2010/main">
-        <mc:Choice Requires="a14">
-          <p:sp>
-            <p:nvSpPr>
               <p:cNvPr id="196" name="TextBox 195">
                 <a:extLst>
                   <a:ext uri="{FF2B5EF4-FFF2-40B4-BE49-F238E27FC236}">
@@ -5286,7 +4152,7 @@
             </p:nvSpPr>
             <p:spPr>
               <a:xfrm>
-                <a:off x="6664756" y="4892981"/>
+                <a:off x="5982465" y="3644133"/>
                 <a:ext cx="166854" cy="223651"/>
               </a:xfrm>
               <a:prstGeom prst="rect">
@@ -5335,7 +4201,7 @@
             </p:txBody>
           </p:sp>
         </mc:Choice>
-        <mc:Fallback xmlns="">
+        <mc:Fallback>
           <p:sp>
             <p:nvSpPr>
               <p:cNvPr id="196" name="TextBox 195">
@@ -5352,16 +4218,16 @@
             </p:nvSpPr>
             <p:spPr>
               <a:xfrm>
-                <a:off x="6664756" y="4892981"/>
+                <a:off x="5982465" y="3644133"/>
                 <a:ext cx="166854" cy="223651"/>
               </a:xfrm>
               <a:prstGeom prst="rect">
                 <a:avLst/>
               </a:prstGeom>
               <a:blipFill>
-                <a:blip r:embed="rId13"/>
+                <a:blip r:embed="rId8"/>
                 <a:stretch>
-                  <a:fillRect l="-7143" t="-10526" r="-7143" b="-5263"/>
+                  <a:fillRect t="-27778" r="-13333"/>
                 </a:stretch>
               </a:blipFill>
             </p:spPr>
@@ -5380,8 +4246,8 @@
           </p:sp>
         </mc:Fallback>
       </mc:AlternateContent>
-      <mc:AlternateContent xmlns:mc="http://schemas.openxmlformats.org/markup-compatibility/2006" xmlns:a14="http://schemas.microsoft.com/office/drawing/2010/main">
-        <mc:Choice Requires="a14">
+      <mc:AlternateContent xmlns:mc="http://schemas.openxmlformats.org/markup-compatibility/2006">
+        <mc:Choice xmlns:a14="http://schemas.microsoft.com/office/drawing/2010/main" Requires="a14">
           <p:sp>
             <p:nvSpPr>
               <p:cNvPr id="197" name="TextBox 196">
@@ -5396,7 +4262,7 @@
             </p:nvSpPr>
             <p:spPr>
               <a:xfrm>
-                <a:off x="6312704" y="4520086"/>
+                <a:off x="5630413" y="3271238"/>
                 <a:ext cx="166854" cy="223651"/>
               </a:xfrm>
               <a:prstGeom prst="rect">
@@ -5443,7 +4309,7 @@
             </p:txBody>
           </p:sp>
         </mc:Choice>
-        <mc:Fallback xmlns="">
+        <mc:Fallback>
           <p:sp>
             <p:nvSpPr>
               <p:cNvPr id="197" name="TextBox 196">
@@ -5460,16 +4326,16 @@
             </p:nvSpPr>
             <p:spPr>
               <a:xfrm>
-                <a:off x="6312704" y="4520086"/>
+                <a:off x="5630413" y="3271238"/>
                 <a:ext cx="166854" cy="223651"/>
               </a:xfrm>
               <a:prstGeom prst="rect">
                 <a:avLst/>
               </a:prstGeom>
               <a:blipFill>
-                <a:blip r:embed="rId14"/>
+                <a:blip r:embed="rId9"/>
                 <a:stretch>
-                  <a:fillRect l="-21429" t="-15789" r="-21429" b="-26316"/>
+                  <a:fillRect l="-7143" t="-26316" r="-14286" b="-15789"/>
                 </a:stretch>
               </a:blipFill>
             </p:spPr>
@@ -5488,334 +4354,8 @@
           </p:sp>
         </mc:Fallback>
       </mc:AlternateContent>
-      <mc:AlternateContent xmlns:mc="http://schemas.openxmlformats.org/markup-compatibility/2006" xmlns:a14="http://schemas.microsoft.com/office/drawing/2010/main">
-        <mc:Choice Requires="a14">
-          <p:sp>
-            <p:nvSpPr>
-              <p:cNvPr id="86" name="TextBox 85">
-                <a:extLst>
-                  <a:ext uri="{FF2B5EF4-FFF2-40B4-BE49-F238E27FC236}">
-                    <a16:creationId xmlns:a16="http://schemas.microsoft.com/office/drawing/2014/main" id="{B3D95B32-1685-214C-BF13-8A9BA7640CB3}"/>
-                  </a:ext>
-                </a:extLst>
-              </p:cNvPr>
-              <p:cNvSpPr txBox="1"/>
-              <p:nvPr/>
-            </p:nvSpPr>
-            <p:spPr>
-              <a:xfrm>
-                <a:off x="6558032" y="1959744"/>
-                <a:ext cx="262380" cy="246221"/>
-              </a:xfrm>
-              <a:prstGeom prst="rect">
-                <a:avLst/>
-              </a:prstGeom>
-              <a:noFill/>
-            </p:spPr>
-            <p:txBody>
-              <a:bodyPr wrap="none" lIns="0" tIns="0" rIns="0" bIns="0" rtlCol="0">
-                <a:spAutoFit/>
-              </a:bodyPr>
-              <a:lstStyle/>
-              <a:p>
-                <a:pPr/>
-                <a14:m>
-                  <m:oMathPara xmlns:m="http://schemas.openxmlformats.org/officeDocument/2006/math">
-                    <m:oMathParaPr>
-                      <m:jc m:val="centerGroup"/>
-                    </m:oMathParaPr>
-                    <m:oMath xmlns:m="http://schemas.openxmlformats.org/officeDocument/2006/math">
-                      <m:sSub>
-                        <m:sSubPr>
-                          <m:ctrlPr>
-                            <a:rPr lang="en-US" sz="1600" b="0" i="1" smtClean="0">
-                              <a:latin typeface="Cambria Math" panose="02040503050406030204" pitchFamily="18" charset="0"/>
-                            </a:rPr>
-                          </m:ctrlPr>
-                        </m:sSubPr>
-                        <m:e>
-                          <m:r>
-                            <a:rPr lang="en-US" sz="1600" b="0" i="1" smtClean="0">
-                              <a:latin typeface="Cambria Math" panose="02040503050406030204" pitchFamily="18" charset="0"/>
-                            </a:rPr>
-                            <m:t>𝑥</m:t>
-                          </m:r>
-                        </m:e>
-                        <m:sub>
-                          <m:r>
-                            <a:rPr lang="en-US" sz="1600" b="0" i="1" smtClean="0">
-                              <a:latin typeface="Cambria Math" panose="02040503050406030204" pitchFamily="18" charset="0"/>
-                            </a:rPr>
-                            <m:t>𝑛</m:t>
-                          </m:r>
-                        </m:sub>
-                      </m:sSub>
-                    </m:oMath>
-                  </m:oMathPara>
-                </a14:m>
-                <a:endParaRPr lang="en-US" sz="1600" dirty="0"/>
-              </a:p>
-            </p:txBody>
-          </p:sp>
-        </mc:Choice>
-        <mc:Fallback xmlns="">
-          <p:sp>
-            <p:nvSpPr>
-              <p:cNvPr id="86" name="TextBox 85">
-                <a:extLst>
-                  <a:ext uri="{FF2B5EF4-FFF2-40B4-BE49-F238E27FC236}">
-                    <a16:creationId xmlns:a16="http://schemas.microsoft.com/office/drawing/2014/main" id="{B3D95B32-1685-214C-BF13-8A9BA7640CB3}"/>
-                  </a:ext>
-                </a:extLst>
-              </p:cNvPr>
-              <p:cNvSpPr txBox="1">
-                <a:spLocks noRot="1" noChangeAspect="1" noMove="1" noResize="1" noEditPoints="1" noAdjustHandles="1" noChangeArrowheads="1" noChangeShapeType="1" noTextEdit="1"/>
-              </p:cNvSpPr>
-              <p:nvPr/>
-            </p:nvSpPr>
-            <p:spPr>
-              <a:xfrm>
-                <a:off x="6558032" y="1959744"/>
-                <a:ext cx="262380" cy="246221"/>
-              </a:xfrm>
-              <a:prstGeom prst="rect">
-                <a:avLst/>
-              </a:prstGeom>
-              <a:blipFill>
-                <a:blip r:embed="rId15"/>
-                <a:stretch>
-                  <a:fillRect l="-9524" b="-4762"/>
-                </a:stretch>
-              </a:blipFill>
-            </p:spPr>
-            <p:txBody>
-              <a:bodyPr/>
-              <a:lstStyle/>
-              <a:p>
-                <a:r>
-                  <a:rPr lang="en-US">
-                    <a:noFill/>
-                  </a:rPr>
-                  <a:t> </a:t>
-                </a:r>
-              </a:p>
-            </p:txBody>
-          </p:sp>
-        </mc:Fallback>
-      </mc:AlternateContent>
-      <mc:AlternateContent xmlns:mc="http://schemas.openxmlformats.org/markup-compatibility/2006" xmlns:a14="http://schemas.microsoft.com/office/drawing/2010/main">
-        <mc:Choice Requires="a14">
-          <p:sp>
-            <p:nvSpPr>
-              <p:cNvPr id="91" name="TextBox 90">
-                <a:extLst>
-                  <a:ext uri="{FF2B5EF4-FFF2-40B4-BE49-F238E27FC236}">
-                    <a16:creationId xmlns:a16="http://schemas.microsoft.com/office/drawing/2014/main" id="{0B16492C-CFFE-9841-BC8E-F90D2E552F02}"/>
-                  </a:ext>
-                </a:extLst>
-              </p:cNvPr>
-              <p:cNvSpPr txBox="1"/>
-              <p:nvPr/>
-            </p:nvSpPr>
-            <p:spPr>
-              <a:xfrm>
-                <a:off x="3501678" y="4599786"/>
-                <a:ext cx="186653" cy="246221"/>
-              </a:xfrm>
-              <a:prstGeom prst="rect">
-                <a:avLst/>
-              </a:prstGeom>
-              <a:noFill/>
-            </p:spPr>
-            <p:txBody>
-              <a:bodyPr wrap="none" lIns="0" tIns="0" rIns="0" bIns="0" rtlCol="0">
-                <a:spAutoFit/>
-              </a:bodyPr>
-              <a:lstStyle/>
-              <a:p>
-                <a:pPr/>
-                <a14:m>
-                  <m:oMathPara xmlns:m="http://schemas.openxmlformats.org/officeDocument/2006/math">
-                    <m:oMathParaPr>
-                      <m:jc m:val="centerGroup"/>
-                    </m:oMathParaPr>
-                    <m:oMath xmlns:m="http://schemas.openxmlformats.org/officeDocument/2006/math">
-                      <m:r>
-                        <a:rPr lang="en-US" sz="1600" b="0" i="1" smtClean="0">
-                          <a:latin typeface="Cambria Math" panose="02040503050406030204" pitchFamily="18" charset="0"/>
-                        </a:rPr>
-                        <m:t>𝐵</m:t>
-                      </m:r>
-                    </m:oMath>
-                  </m:oMathPara>
-                </a14:m>
-                <a:endParaRPr lang="en-US" sz="1600" dirty="0"/>
-              </a:p>
-            </p:txBody>
-          </p:sp>
-        </mc:Choice>
-        <mc:Fallback xmlns="">
-          <p:sp>
-            <p:nvSpPr>
-              <p:cNvPr id="91" name="TextBox 90">
-                <a:extLst>
-                  <a:ext uri="{FF2B5EF4-FFF2-40B4-BE49-F238E27FC236}">
-                    <a16:creationId xmlns:a16="http://schemas.microsoft.com/office/drawing/2014/main" id="{0B16492C-CFFE-9841-BC8E-F90D2E552F02}"/>
-                  </a:ext>
-                </a:extLst>
-              </p:cNvPr>
-              <p:cNvSpPr txBox="1">
-                <a:spLocks noRot="1" noChangeAspect="1" noMove="1" noResize="1" noEditPoints="1" noAdjustHandles="1" noChangeArrowheads="1" noChangeShapeType="1" noTextEdit="1"/>
-              </p:cNvSpPr>
-              <p:nvPr/>
-            </p:nvSpPr>
-            <p:spPr>
-              <a:xfrm>
-                <a:off x="3501678" y="4599786"/>
-                <a:ext cx="186653" cy="246221"/>
-              </a:xfrm>
-              <a:prstGeom prst="rect">
-                <a:avLst/>
-              </a:prstGeom>
-              <a:blipFill>
-                <a:blip r:embed="rId16"/>
-                <a:stretch>
-                  <a:fillRect l="-35714" r="-21429" b="-4762"/>
-                </a:stretch>
-              </a:blipFill>
-            </p:spPr>
-            <p:txBody>
-              <a:bodyPr/>
-              <a:lstStyle/>
-              <a:p>
-                <a:r>
-                  <a:rPr lang="en-US">
-                    <a:noFill/>
-                  </a:rPr>
-                  <a:t> </a:t>
-                </a:r>
-              </a:p>
-            </p:txBody>
-          </p:sp>
-        </mc:Fallback>
-      </mc:AlternateContent>
-      <mc:AlternateContent xmlns:mc="http://schemas.openxmlformats.org/markup-compatibility/2006" xmlns:a14="http://schemas.microsoft.com/office/drawing/2010/main">
-        <mc:Choice Requires="a14">
-          <p:sp>
-            <p:nvSpPr>
-              <p:cNvPr id="199" name="TextBox 198">
-                <a:extLst>
-                  <a:ext uri="{FF2B5EF4-FFF2-40B4-BE49-F238E27FC236}">
-                    <a16:creationId xmlns:a16="http://schemas.microsoft.com/office/drawing/2014/main" id="{8B6B738F-72C0-BA46-AAD0-B93F6BAFDAF6}"/>
-                  </a:ext>
-                </a:extLst>
-              </p:cNvPr>
-              <p:cNvSpPr txBox="1"/>
-              <p:nvPr/>
-            </p:nvSpPr>
-            <p:spPr>
-              <a:xfrm>
-                <a:off x="5365434" y="2575435"/>
-                <a:ext cx="242181" cy="246221"/>
-              </a:xfrm>
-              <a:prstGeom prst="rect">
-                <a:avLst/>
-              </a:prstGeom>
-              <a:noFill/>
-            </p:spPr>
-            <p:txBody>
-              <a:bodyPr wrap="none" lIns="0" tIns="0" rIns="0" bIns="0" rtlCol="0">
-                <a:spAutoFit/>
-              </a:bodyPr>
-              <a:lstStyle/>
-              <a:p>
-                <a:pPr/>
-                <a14:m>
-                  <m:oMathPara xmlns:m="http://schemas.openxmlformats.org/officeDocument/2006/math">
-                    <m:oMathParaPr>
-                      <m:jc m:val="centerGroup"/>
-                    </m:oMathParaPr>
-                    <m:oMath xmlns:m="http://schemas.openxmlformats.org/officeDocument/2006/math">
-                      <m:sSub>
-                        <m:sSubPr>
-                          <m:ctrlPr>
-                            <a:rPr lang="en-US" sz="1600" b="0" i="1" smtClean="0">
-                              <a:latin typeface="Cambria Math" panose="02040503050406030204" pitchFamily="18" charset="0"/>
-                            </a:rPr>
-                          </m:ctrlPr>
-                        </m:sSubPr>
-                        <m:e>
-                          <m:r>
-                            <a:rPr lang="en-US" sz="1600" b="0" i="1" smtClean="0">
-                              <a:latin typeface="Cambria Math" panose="02040503050406030204" pitchFamily="18" charset="0"/>
-                            </a:rPr>
-                            <m:t>𝑒</m:t>
-                          </m:r>
-                        </m:e>
-                        <m:sub>
-                          <m:r>
-                            <a:rPr lang="en-US" sz="1600" b="0" i="1" smtClean="0">
-                              <a:latin typeface="Cambria Math" panose="02040503050406030204" pitchFamily="18" charset="0"/>
-                            </a:rPr>
-                            <m:t>𝑥</m:t>
-                          </m:r>
-                        </m:sub>
-                      </m:sSub>
-                    </m:oMath>
-                  </m:oMathPara>
-                </a14:m>
-                <a:endParaRPr lang="en-US" sz="1600" dirty="0"/>
-              </a:p>
-            </p:txBody>
-          </p:sp>
-        </mc:Choice>
-        <mc:Fallback xmlns="">
-          <p:sp>
-            <p:nvSpPr>
-              <p:cNvPr id="199" name="TextBox 198">
-                <a:extLst>
-                  <a:ext uri="{FF2B5EF4-FFF2-40B4-BE49-F238E27FC236}">
-                    <a16:creationId xmlns:a16="http://schemas.microsoft.com/office/drawing/2014/main" id="{8B6B738F-72C0-BA46-AAD0-B93F6BAFDAF6}"/>
-                  </a:ext>
-                </a:extLst>
-              </p:cNvPr>
-              <p:cNvSpPr txBox="1">
-                <a:spLocks noRot="1" noChangeAspect="1" noMove="1" noResize="1" noEditPoints="1" noAdjustHandles="1" noChangeArrowheads="1" noChangeShapeType="1" noTextEdit="1"/>
-              </p:cNvSpPr>
-              <p:nvPr/>
-            </p:nvSpPr>
-            <p:spPr>
-              <a:xfrm>
-                <a:off x="5365434" y="2575435"/>
-                <a:ext cx="242181" cy="246221"/>
-              </a:xfrm>
-              <a:prstGeom prst="rect">
-                <a:avLst/>
-              </a:prstGeom>
-              <a:blipFill>
-                <a:blip r:embed="rId17"/>
-                <a:stretch>
-                  <a:fillRect l="-4762" b="-10000"/>
-                </a:stretch>
-              </a:blipFill>
-            </p:spPr>
-            <p:txBody>
-              <a:bodyPr/>
-              <a:lstStyle/>
-              <a:p>
-                <a:r>
-                  <a:rPr lang="en-US">
-                    <a:noFill/>
-                  </a:rPr>
-                  <a:t> </a:t>
-                </a:r>
-              </a:p>
-            </p:txBody>
-          </p:sp>
-        </mc:Fallback>
-      </mc:AlternateContent>
-      <mc:AlternateContent xmlns:mc="http://schemas.openxmlformats.org/markup-compatibility/2006" xmlns:a14="http://schemas.microsoft.com/office/drawing/2010/main">
-        <mc:Choice Requires="a14">
+      <mc:AlternateContent xmlns:mc="http://schemas.openxmlformats.org/markup-compatibility/2006">
+        <mc:Choice xmlns:a14="http://schemas.microsoft.com/office/drawing/2010/main" Requires="a14">
           <p:sp>
             <p:nvSpPr>
               <p:cNvPr id="200" name="TextBox 199">
@@ -5830,7 +4370,7 @@
             </p:nvSpPr>
             <p:spPr>
               <a:xfrm>
-                <a:off x="3868168" y="4161213"/>
+                <a:off x="4519809" y="3393958"/>
                 <a:ext cx="171650" cy="246221"/>
               </a:xfrm>
               <a:prstGeom prst="rect">
@@ -5865,7 +4405,7 @@
             </p:txBody>
           </p:sp>
         </mc:Choice>
-        <mc:Fallback xmlns="">
+        <mc:Fallback>
           <p:sp>
             <p:nvSpPr>
               <p:cNvPr id="200" name="TextBox 199">
@@ -5882,16 +4422,16 @@
             </p:nvSpPr>
             <p:spPr>
               <a:xfrm>
-                <a:off x="3868168" y="4161213"/>
+                <a:off x="4519809" y="3393958"/>
                 <a:ext cx="171650" cy="246221"/>
               </a:xfrm>
               <a:prstGeom prst="rect">
                 <a:avLst/>
               </a:prstGeom>
               <a:blipFill>
-                <a:blip r:embed="rId18"/>
+                <a:blip r:embed="rId10"/>
                 <a:stretch>
-                  <a:fillRect l="-28571" r="-21429" b="-5000"/>
+                  <a:fillRect l="-26667" r="-20000" b="-5000"/>
                 </a:stretch>
               </a:blipFill>
             </p:spPr>
@@ -5926,7 +4466,7 @@
         </p:nvCxnSpPr>
         <p:spPr>
           <a:xfrm flipH="1" flipV="1">
-            <a:off x="3266754" y="3639448"/>
+            <a:off x="3918395" y="2872193"/>
             <a:ext cx="2300" cy="412499"/>
           </a:xfrm>
           <a:prstGeom prst="line">
@@ -5971,7 +4511,7 @@
         </p:nvCxnSpPr>
         <p:spPr>
           <a:xfrm flipH="1">
-            <a:off x="4235536" y="5303639"/>
+            <a:off x="4887177" y="4536384"/>
             <a:ext cx="1403321" cy="13408"/>
           </a:xfrm>
           <a:prstGeom prst="line">
@@ -6014,7 +4554,7 @@
         </p:nvCxnSpPr>
         <p:spPr>
           <a:xfrm flipH="1">
-            <a:off x="2072128" y="2527375"/>
+            <a:off x="2723769" y="1760120"/>
             <a:ext cx="411546" cy="3"/>
           </a:xfrm>
           <a:prstGeom prst="line">
@@ -6057,7 +4597,7 @@
         </p:nvCxnSpPr>
         <p:spPr>
           <a:xfrm flipH="1" flipV="1">
-            <a:off x="2473716" y="2529338"/>
+            <a:off x="3125357" y="1762083"/>
             <a:ext cx="7014" cy="1145140"/>
           </a:xfrm>
           <a:prstGeom prst="line">
@@ -6094,7 +4634,7 @@
         </p:nvCxnSpPr>
         <p:spPr>
           <a:xfrm>
-            <a:off x="1930651" y="3276758"/>
+            <a:off x="2582292" y="2509503"/>
             <a:ext cx="1649011" cy="1250337"/>
           </a:xfrm>
           <a:prstGeom prst="line">
@@ -6137,7 +4677,7 @@
         </p:nvCxnSpPr>
         <p:spPr>
           <a:xfrm flipH="1">
-            <a:off x="5638857" y="5317047"/>
+            <a:off x="6290498" y="4549792"/>
             <a:ext cx="1" cy="370510"/>
           </a:xfrm>
           <a:prstGeom prst="line">
@@ -6180,7 +4720,7 @@
         </p:nvCxnSpPr>
         <p:spPr>
           <a:xfrm flipV="1">
-            <a:off x="4933414" y="5025260"/>
+            <a:off x="5585055" y="4258005"/>
             <a:ext cx="0" cy="395286"/>
           </a:xfrm>
           <a:prstGeom prst="line">
@@ -6223,7 +4763,7 @@
         </p:nvSpPr>
         <p:spPr>
           <a:xfrm>
-            <a:off x="4902508" y="5276671"/>
+            <a:off x="5554149" y="4509416"/>
             <a:ext cx="61136" cy="58709"/>
           </a:xfrm>
           <a:prstGeom prst="ellipse">
@@ -6273,7 +4813,7 @@
         </p:nvCxnSpPr>
         <p:spPr>
           <a:xfrm>
-            <a:off x="2362299" y="3055067"/>
+            <a:off x="3013940" y="2287812"/>
             <a:ext cx="368182" cy="6306"/>
           </a:xfrm>
           <a:prstGeom prst="line">
@@ -6316,7 +4856,7 @@
         </p:nvSpPr>
         <p:spPr>
           <a:xfrm>
-            <a:off x="2439834" y="3025712"/>
+            <a:off x="3091475" y="2258457"/>
             <a:ext cx="61136" cy="58709"/>
           </a:xfrm>
           <a:prstGeom prst="ellipse">
@@ -6350,323 +4890,6 @@
           </a:p>
         </p:txBody>
       </p:sp>
-      <p:cxnSp>
-        <p:nvCxnSpPr>
-          <p:cNvPr id="265" name="Straight Connector 264">
-            <a:extLst>
-              <a:ext uri="{FF2B5EF4-FFF2-40B4-BE49-F238E27FC236}">
-                <a16:creationId xmlns:a16="http://schemas.microsoft.com/office/drawing/2014/main" id="{5E85C783-7EDD-2341-9350-3938B05A45E8}"/>
-              </a:ext>
-            </a:extLst>
-          </p:cNvPr>
-          <p:cNvCxnSpPr>
-            <a:cxnSpLocks/>
-          </p:cNvCxnSpPr>
-          <p:nvPr/>
-        </p:nvCxnSpPr>
-        <p:spPr>
-          <a:xfrm flipH="1" flipV="1">
-            <a:off x="3262866" y="2260232"/>
-            <a:ext cx="2300" cy="412499"/>
-          </a:xfrm>
-          <a:prstGeom prst="line">
-            <a:avLst/>
-          </a:prstGeom>
-          <a:ln w="38100" cmpd="sng">
-            <a:solidFill>
-              <a:schemeClr val="tx1"/>
-            </a:solidFill>
-            <a:headEnd type="none" w="sm" len="lg"/>
-            <a:tailEnd type="triangle" w="sm" len="lg"/>
-          </a:ln>
-        </p:spPr>
-        <p:style>
-          <a:lnRef idx="2">
-            <a:schemeClr val="accent1"/>
-          </a:lnRef>
-          <a:fillRef idx="0">
-            <a:schemeClr val="accent1"/>
-          </a:fillRef>
-          <a:effectRef idx="1">
-            <a:schemeClr val="accent1"/>
-          </a:effectRef>
-          <a:fontRef idx="minor">
-            <a:schemeClr val="tx1"/>
-          </a:fontRef>
-        </p:style>
-      </p:cxnSp>
-      <p:cxnSp>
-        <p:nvCxnSpPr>
-          <p:cNvPr id="266" name="Straight Connector 265">
-            <a:extLst>
-              <a:ext uri="{FF2B5EF4-FFF2-40B4-BE49-F238E27FC236}">
-                <a16:creationId xmlns:a16="http://schemas.microsoft.com/office/drawing/2014/main" id="{E07F800C-2D2C-3043-BFC6-8C15DF9F684A}"/>
-              </a:ext>
-            </a:extLst>
-          </p:cNvPr>
-          <p:cNvCxnSpPr/>
-          <p:nvPr/>
-        </p:nvCxnSpPr>
-        <p:spPr>
-          <a:xfrm>
-            <a:off x="3917083" y="3204250"/>
-            <a:ext cx="394723" cy="0"/>
-          </a:xfrm>
-          <a:prstGeom prst="line">
-            <a:avLst/>
-          </a:prstGeom>
-          <a:ln w="38100" cmpd="sng">
-            <a:solidFill>
-              <a:schemeClr val="tx1"/>
-            </a:solidFill>
-            <a:headEnd type="none" w="sm" len="lg"/>
-            <a:tailEnd type="triangle" w="sm" len="lg"/>
-          </a:ln>
-        </p:spPr>
-        <p:style>
-          <a:lnRef idx="2">
-            <a:schemeClr val="accent1"/>
-          </a:lnRef>
-          <a:fillRef idx="0">
-            <a:schemeClr val="accent1"/>
-          </a:fillRef>
-          <a:effectRef idx="1">
-            <a:schemeClr val="accent1"/>
-          </a:effectRef>
-          <a:fontRef idx="minor">
-            <a:schemeClr val="tx1"/>
-          </a:fontRef>
-        </p:style>
-      </p:cxnSp>
-      <p:cxnSp>
-        <p:nvCxnSpPr>
-          <p:cNvPr id="267" name="Straight Connector 266">
-            <a:extLst>
-              <a:ext uri="{FF2B5EF4-FFF2-40B4-BE49-F238E27FC236}">
-                <a16:creationId xmlns:a16="http://schemas.microsoft.com/office/drawing/2014/main" id="{102054B3-F6A4-B248-B1DF-00A8FF373098}"/>
-              </a:ext>
-            </a:extLst>
-          </p:cNvPr>
-          <p:cNvCxnSpPr/>
-          <p:nvPr/>
-        </p:nvCxnSpPr>
-        <p:spPr>
-          <a:xfrm>
-            <a:off x="5499189" y="4591777"/>
-            <a:ext cx="394723" cy="0"/>
-          </a:xfrm>
-          <a:prstGeom prst="line">
-            <a:avLst/>
-          </a:prstGeom>
-          <a:ln w="38100" cmpd="sng">
-            <a:solidFill>
-              <a:schemeClr val="tx1"/>
-            </a:solidFill>
-            <a:headEnd type="none" w="sm" len="lg"/>
-            <a:tailEnd type="triangle" w="sm" len="lg"/>
-          </a:ln>
-        </p:spPr>
-        <p:style>
-          <a:lnRef idx="2">
-            <a:schemeClr val="accent1"/>
-          </a:lnRef>
-          <a:fillRef idx="0">
-            <a:schemeClr val="accent1"/>
-          </a:fillRef>
-          <a:effectRef idx="1">
-            <a:schemeClr val="accent1"/>
-          </a:effectRef>
-          <a:fontRef idx="minor">
-            <a:schemeClr val="tx1"/>
-          </a:fontRef>
-        </p:style>
-      </p:cxnSp>
-      <p:cxnSp>
-        <p:nvCxnSpPr>
-          <p:cNvPr id="269" name="Straight Connector 268">
-            <a:extLst>
-              <a:ext uri="{FF2B5EF4-FFF2-40B4-BE49-F238E27FC236}">
-                <a16:creationId xmlns:a16="http://schemas.microsoft.com/office/drawing/2014/main" id="{E7265C2F-7369-9847-8CF5-E936F69BF708}"/>
-              </a:ext>
-            </a:extLst>
-          </p:cNvPr>
-          <p:cNvCxnSpPr>
-            <a:cxnSpLocks/>
-          </p:cNvCxnSpPr>
-          <p:nvPr/>
-        </p:nvCxnSpPr>
-        <p:spPr>
-          <a:xfrm flipH="1" flipV="1">
-            <a:off x="4913686" y="3639447"/>
-            <a:ext cx="2300" cy="412499"/>
-          </a:xfrm>
-          <a:prstGeom prst="line">
-            <a:avLst/>
-          </a:prstGeom>
-          <a:ln w="38100" cmpd="sng">
-            <a:solidFill>
-              <a:schemeClr val="tx1"/>
-            </a:solidFill>
-            <a:headEnd type="none" w="sm" len="lg"/>
-            <a:tailEnd type="triangle" w="sm" len="lg"/>
-          </a:ln>
-        </p:spPr>
-        <p:style>
-          <a:lnRef idx="2">
-            <a:schemeClr val="accent1"/>
-          </a:lnRef>
-          <a:fillRef idx="0">
-            <a:schemeClr val="accent1"/>
-          </a:fillRef>
-          <a:effectRef idx="1">
-            <a:schemeClr val="accent1"/>
-          </a:effectRef>
-          <a:fontRef idx="minor">
-            <a:schemeClr val="tx1"/>
-          </a:fontRef>
-        </p:style>
-      </p:cxnSp>
-      <mc:AlternateContent xmlns:mc="http://schemas.openxmlformats.org/markup-compatibility/2006">
-        <mc:Choice xmlns:a14="http://schemas.microsoft.com/office/drawing/2010/main" Requires="a14">
-          <p:sp>
-            <p:nvSpPr>
-              <p:cNvPr id="270" name="TextBox 269">
-                <a:extLst>
-                  <a:ext uri="{FF2B5EF4-FFF2-40B4-BE49-F238E27FC236}">
-                    <a16:creationId xmlns:a16="http://schemas.microsoft.com/office/drawing/2014/main" id="{4115BD80-38BC-074B-8A31-13AED5EEEAB3}"/>
-                  </a:ext>
-                </a:extLst>
-              </p:cNvPr>
-              <p:cNvSpPr txBox="1"/>
-              <p:nvPr/>
-            </p:nvSpPr>
-            <p:spPr>
-              <a:xfrm>
-                <a:off x="3493779" y="3351408"/>
-                <a:ext cx="473142" cy="256737"/>
-              </a:xfrm>
-              <a:prstGeom prst="rect">
-                <a:avLst/>
-              </a:prstGeom>
-              <a:noFill/>
-            </p:spPr>
-            <p:txBody>
-              <a:bodyPr wrap="none" lIns="0" tIns="0" rIns="0" bIns="0" rtlCol="0">
-                <a:spAutoFit/>
-              </a:bodyPr>
-              <a:lstStyle/>
-              <a:p>
-                <a:pPr/>
-                <a14:m>
-                  <m:oMathPara xmlns:m="http://schemas.openxmlformats.org/officeDocument/2006/math">
-                    <m:oMathParaPr>
-                      <m:jc m:val="centerGroup"/>
-                    </m:oMathParaPr>
-                    <m:oMath xmlns:m="http://schemas.openxmlformats.org/officeDocument/2006/math">
-                      <m:sSubSup>
-                        <m:sSubSupPr>
-                          <m:ctrlPr>
-                            <a:rPr lang="en-US" sz="1600" b="0" i="1" smtClean="0">
-                              <a:latin typeface="Cambria Math" panose="02040503050406030204" pitchFamily="18" charset="0"/>
-                            </a:rPr>
-                          </m:ctrlPr>
-                        </m:sSubSupPr>
-                        <m:e>
-                          <m:acc>
-                            <m:accPr>
-                              <m:chr m:val="̂"/>
-                              <m:ctrlPr>
-                                <a:rPr lang="en-US" sz="1600" b="0" i="1" smtClean="0">
-                                  <a:latin typeface="Cambria Math" panose="02040503050406030204" pitchFamily="18" charset="0"/>
-                                </a:rPr>
-                              </m:ctrlPr>
-                            </m:accPr>
-                            <m:e>
-                              <m:r>
-                                <a:rPr lang="en-US" sz="1600" b="0" i="1" smtClean="0">
-                                  <a:latin typeface="Cambria Math" panose="02040503050406030204" pitchFamily="18" charset="0"/>
-                                </a:rPr>
-                                <m:t>𝑢</m:t>
-                              </m:r>
-                            </m:e>
-                          </m:acc>
-                        </m:e>
-                        <m:sub>
-                          <m:r>
-                            <a:rPr lang="en-US" sz="1600" b="0" i="1" smtClean="0">
-                              <a:latin typeface="Cambria Math" panose="02040503050406030204" pitchFamily="18" charset="0"/>
-                            </a:rPr>
-                            <m:t>𝑑</m:t>
-                          </m:r>
-                        </m:sub>
-                        <m:sup>
-                          <m:r>
-                            <a:rPr lang="en-US" sz="1600" b="0" i="1" smtClean="0">
-                              <a:latin typeface="Cambria Math" panose="02040503050406030204" pitchFamily="18" charset="0"/>
-                            </a:rPr>
-                            <m:t>𝑛</m:t>
-                          </m:r>
-                          <m:r>
-                            <a:rPr lang="en-US" sz="1600" b="0" i="1" smtClean="0">
-                              <a:latin typeface="Cambria Math" panose="02040503050406030204" pitchFamily="18" charset="0"/>
-                            </a:rPr>
-                            <m:t>+1</m:t>
-                          </m:r>
-                        </m:sup>
-                      </m:sSubSup>
-                    </m:oMath>
-                  </m:oMathPara>
-                </a14:m>
-                <a:endParaRPr lang="en-US" sz="1600" dirty="0"/>
-              </a:p>
-            </p:txBody>
-          </p:sp>
-        </mc:Choice>
-        <mc:Fallback>
-          <p:sp>
-            <p:nvSpPr>
-              <p:cNvPr id="270" name="TextBox 269">
-                <a:extLst>
-                  <a:ext uri="{FF2B5EF4-FFF2-40B4-BE49-F238E27FC236}">
-                    <a16:creationId xmlns:a16="http://schemas.microsoft.com/office/drawing/2014/main" id="{4115BD80-38BC-074B-8A31-13AED5EEEAB3}"/>
-                  </a:ext>
-                </a:extLst>
-              </p:cNvPr>
-              <p:cNvSpPr txBox="1">
-                <a:spLocks noRot="1" noChangeAspect="1" noMove="1" noResize="1" noEditPoints="1" noAdjustHandles="1" noChangeArrowheads="1" noChangeShapeType="1" noTextEdit="1"/>
-              </p:cNvSpPr>
-              <p:nvPr/>
-            </p:nvSpPr>
-            <p:spPr>
-              <a:xfrm>
-                <a:off x="3493779" y="3351408"/>
-                <a:ext cx="473142" cy="256737"/>
-              </a:xfrm>
-              <a:prstGeom prst="rect">
-                <a:avLst/>
-              </a:prstGeom>
-              <a:blipFill>
-                <a:blip r:embed="rId19"/>
-                <a:stretch>
-                  <a:fillRect l="-5263" t="-15000" r="-2632" b="-20000"/>
-                </a:stretch>
-              </a:blipFill>
-            </p:spPr>
-            <p:txBody>
-              <a:bodyPr/>
-              <a:lstStyle/>
-              <a:p>
-                <a:r>
-                  <a:rPr lang="en-US">
-                    <a:noFill/>
-                  </a:rPr>
-                  <a:t> </a:t>
-                </a:r>
-              </a:p>
-            </p:txBody>
-          </p:sp>
-        </mc:Fallback>
-      </mc:AlternateContent>
       <p:sp>
         <p:nvSpPr>
           <p:cNvPr id="273" name="Oval 272">
@@ -6681,7 +4904,7 @@
         </p:nvSpPr>
         <p:spPr>
           <a:xfrm>
-            <a:off x="2704656" y="4059677"/>
+            <a:off x="3356297" y="3292422"/>
             <a:ext cx="228843" cy="211796"/>
           </a:xfrm>
           <a:prstGeom prst="ellipse">
@@ -6738,7 +4961,7 @@
         </p:nvSpPr>
         <p:spPr>
           <a:xfrm>
-            <a:off x="3772269" y="5052478"/>
+            <a:off x="4423910" y="4285223"/>
             <a:ext cx="228843" cy="211796"/>
           </a:xfrm>
           <a:prstGeom prst="ellipse">
@@ -6781,8 +5004,8 @@
           </a:p>
         </p:txBody>
       </p:sp>
-      <mc:AlternateContent xmlns:mc="http://schemas.openxmlformats.org/markup-compatibility/2006" xmlns:a14="http://schemas.microsoft.com/office/drawing/2010/main">
-        <mc:Choice Requires="a14">
+      <mc:AlternateContent xmlns:mc="http://schemas.openxmlformats.org/markup-compatibility/2006">
+        <mc:Choice xmlns:a14="http://schemas.microsoft.com/office/drawing/2010/main" Requires="a14">
           <p:sp>
             <p:nvSpPr>
               <p:cNvPr id="275" name="TextBox 274">
@@ -6797,7 +5020,7 @@
             </p:nvSpPr>
             <p:spPr>
               <a:xfrm>
-                <a:off x="4289606" y="4517521"/>
+                <a:off x="4941247" y="3750266"/>
                 <a:ext cx="309444" cy="276999"/>
               </a:xfrm>
               <a:prstGeom prst="rect">
@@ -6851,7 +5074,7 @@
             </p:txBody>
           </p:sp>
         </mc:Choice>
-        <mc:Fallback xmlns="">
+        <mc:Fallback>
           <p:sp>
             <p:nvSpPr>
               <p:cNvPr id="275" name="TextBox 274">
@@ -6868,16 +5091,16 @@
             </p:nvSpPr>
             <p:spPr>
               <a:xfrm>
-                <a:off x="4289606" y="4517521"/>
+                <a:off x="4941247" y="3750266"/>
                 <a:ext cx="309444" cy="276999"/>
               </a:xfrm>
               <a:prstGeom prst="rect">
                 <a:avLst/>
               </a:prstGeom>
               <a:blipFill>
-                <a:blip r:embed="rId20"/>
+                <a:blip r:embed="rId11"/>
                 <a:stretch>
-                  <a:fillRect l="-8000" b="-8696"/>
+                  <a:fillRect l="-12000" r="-4000" b="-13043"/>
                 </a:stretch>
               </a:blipFill>
             </p:spPr>
@@ -6896,8 +5119,8 @@
           </p:sp>
         </mc:Fallback>
       </mc:AlternateContent>
-      <mc:AlternateContent xmlns:mc="http://schemas.openxmlformats.org/markup-compatibility/2006" xmlns:a14="http://schemas.microsoft.com/office/drawing/2010/main">
-        <mc:Choice Requires="a14">
+      <mc:AlternateContent xmlns:mc="http://schemas.openxmlformats.org/markup-compatibility/2006">
+        <mc:Choice xmlns:a14="http://schemas.microsoft.com/office/drawing/2010/main" Requires="a14">
           <p:sp>
             <p:nvSpPr>
               <p:cNvPr id="276" name="TextBox 275">
@@ -6912,7 +5135,7 @@
             </p:nvSpPr>
             <p:spPr>
               <a:xfrm>
-                <a:off x="2952120" y="3333123"/>
+                <a:off x="3603761" y="2565868"/>
                 <a:ext cx="315791" cy="276999"/>
               </a:xfrm>
               <a:prstGeom prst="rect">
@@ -6966,7 +5189,7 @@
             </p:txBody>
           </p:sp>
         </mc:Choice>
-        <mc:Fallback xmlns="">
+        <mc:Fallback>
           <p:sp>
             <p:nvSpPr>
               <p:cNvPr id="276" name="TextBox 275">
@@ -6983,16 +5206,16 @@
             </p:nvSpPr>
             <p:spPr>
               <a:xfrm>
-                <a:off x="2952120" y="3333123"/>
+                <a:off x="3603761" y="2565868"/>
                 <a:ext cx="315791" cy="276999"/>
               </a:xfrm>
               <a:prstGeom prst="rect">
                 <a:avLst/>
               </a:prstGeom>
               <a:blipFill>
-                <a:blip r:embed="rId21"/>
+                <a:blip r:embed="rId12"/>
                 <a:stretch>
-                  <a:fillRect l="-7692" r="-3846" b="-13043"/>
+                  <a:fillRect l="-7692" r="-3846" b="-18182"/>
                 </a:stretch>
               </a:blipFill>
             </p:spPr>
@@ -7025,7 +5248,7 @@
         </p:nvCxnSpPr>
         <p:spPr>
           <a:xfrm>
-            <a:off x="2321031" y="4571700"/>
+            <a:off x="2972672" y="3804445"/>
             <a:ext cx="394723" cy="0"/>
           </a:xfrm>
           <a:prstGeom prst="line">
@@ -7054,8 +5277,8 @@
           </a:fontRef>
         </p:style>
       </p:cxnSp>
-      <mc:AlternateContent xmlns:mc="http://schemas.openxmlformats.org/markup-compatibility/2006" xmlns:a14="http://schemas.microsoft.com/office/drawing/2010/main">
-        <mc:Choice Requires="a14">
+      <mc:AlternateContent xmlns:mc="http://schemas.openxmlformats.org/markup-compatibility/2006">
+        <mc:Choice xmlns:a14="http://schemas.microsoft.com/office/drawing/2010/main" Requires="a14">
           <p:sp>
             <p:nvSpPr>
               <p:cNvPr id="278" name="TextBox 277">
@@ -7070,7 +5293,7 @@
             </p:nvSpPr>
             <p:spPr>
               <a:xfrm>
-                <a:off x="2016518" y="4515332"/>
+                <a:off x="2668159" y="3748077"/>
                 <a:ext cx="363881" cy="276999"/>
               </a:xfrm>
               <a:prstGeom prst="rect">
@@ -7124,7 +5347,7 @@
             </p:txBody>
           </p:sp>
         </mc:Choice>
-        <mc:Fallback xmlns="">
+        <mc:Fallback>
           <p:sp>
             <p:nvSpPr>
               <p:cNvPr id="278" name="TextBox 277">
@@ -7141,16 +5364,16 @@
             </p:nvSpPr>
             <p:spPr>
               <a:xfrm>
-                <a:off x="2016518" y="4515332"/>
+                <a:off x="2668159" y="3748077"/>
                 <a:ext cx="363881" cy="276999"/>
               </a:xfrm>
               <a:prstGeom prst="rect">
                 <a:avLst/>
               </a:prstGeom>
               <a:blipFill>
-                <a:blip r:embed="rId22"/>
+                <a:blip r:embed="rId13"/>
                 <a:stretch>
-                  <a:fillRect l="-6897" r="-3448" b="-13636"/>
+                  <a:fillRect l="-10345" r="-6897" b="-18182"/>
                 </a:stretch>
               </a:blipFill>
             </p:spPr>
@@ -7185,7 +5408,7 @@
         </p:nvCxnSpPr>
         <p:spPr>
           <a:xfrm flipH="1" flipV="1">
-            <a:off x="3264417" y="5054586"/>
+            <a:off x="3916058" y="4287331"/>
             <a:ext cx="2300" cy="412499"/>
           </a:xfrm>
           <a:prstGeom prst="line">
@@ -7214,8 +5437,8 @@
           </a:fontRef>
         </p:style>
       </p:cxnSp>
-      <mc:AlternateContent xmlns:mc="http://schemas.openxmlformats.org/markup-compatibility/2006" xmlns:a14="http://schemas.microsoft.com/office/drawing/2010/main">
-        <mc:Choice Requires="a14">
+      <mc:AlternateContent xmlns:mc="http://schemas.openxmlformats.org/markup-compatibility/2006">
+        <mc:Choice xmlns:a14="http://schemas.microsoft.com/office/drawing/2010/main" Requires="a14">
           <p:sp>
             <p:nvSpPr>
               <p:cNvPr id="280" name="TextBox 279">
@@ -7230,7 +5453,7 @@
             </p:nvSpPr>
             <p:spPr>
               <a:xfrm>
-                <a:off x="2947439" y="5264948"/>
+                <a:off x="3599080" y="4497693"/>
                 <a:ext cx="274947" cy="276999"/>
               </a:xfrm>
               <a:prstGeom prst="rect">
@@ -7284,7 +5507,7 @@
             </p:txBody>
           </p:sp>
         </mc:Choice>
-        <mc:Fallback xmlns="">
+        <mc:Fallback>
           <p:sp>
             <p:nvSpPr>
               <p:cNvPr id="280" name="TextBox 279">
@@ -7301,16 +5524,16 @@
             </p:nvSpPr>
             <p:spPr>
               <a:xfrm>
-                <a:off x="2947439" y="5264948"/>
+                <a:off x="3599080" y="4497693"/>
                 <a:ext cx="274947" cy="276999"/>
               </a:xfrm>
               <a:prstGeom prst="rect">
                 <a:avLst/>
               </a:prstGeom>
               <a:blipFill>
-                <a:blip r:embed="rId23"/>
+                <a:blip r:embed="rId14"/>
                 <a:stretch>
-                  <a:fillRect l="-8696" b="-13636"/>
+                  <a:fillRect l="-13043" r="-4348" b="-18182"/>
                 </a:stretch>
               </a:blipFill>
             </p:spPr>
@@ -7343,7 +5566,7 @@
         </p:nvCxnSpPr>
         <p:spPr>
           <a:xfrm>
-            <a:off x="7420902" y="3932616"/>
+            <a:off x="6509386" y="3178698"/>
             <a:ext cx="0" cy="1318321"/>
           </a:xfrm>
           <a:prstGeom prst="straightConnector1">
@@ -7372,8 +5595,8 @@
           </a:fontRef>
         </p:style>
       </p:cxnSp>
-      <mc:AlternateContent xmlns:mc="http://schemas.openxmlformats.org/markup-compatibility/2006" xmlns:a14="http://schemas.microsoft.com/office/drawing/2010/main">
-        <mc:Choice Requires="a14">
+      <mc:AlternateContent xmlns:mc="http://schemas.openxmlformats.org/markup-compatibility/2006">
+        <mc:Choice xmlns:a14="http://schemas.microsoft.com/office/drawing/2010/main" Requires="a14">
           <p:sp>
             <p:nvSpPr>
               <p:cNvPr id="283" name="TextBox 282">
@@ -7388,7 +5611,7 @@
             </p:nvSpPr>
             <p:spPr>
               <a:xfrm>
-                <a:off x="7457254" y="4428058"/>
+                <a:off x="6545738" y="3674140"/>
                 <a:ext cx="287258" cy="246221"/>
               </a:xfrm>
               <a:prstGeom prst="rect">
@@ -7434,7 +5657,7 @@
             </p:txBody>
           </p:sp>
         </mc:Choice>
-        <mc:Fallback xmlns="">
+        <mc:Fallback>
           <p:sp>
             <p:nvSpPr>
               <p:cNvPr id="283" name="TextBox 282">
@@ -7451,16 +5674,16 @@
             </p:nvSpPr>
             <p:spPr>
               <a:xfrm>
-                <a:off x="7457254" y="4428058"/>
+                <a:off x="6545738" y="3674140"/>
                 <a:ext cx="287258" cy="246221"/>
               </a:xfrm>
               <a:prstGeom prst="rect">
                 <a:avLst/>
               </a:prstGeom>
               <a:blipFill>
-                <a:blip r:embed="rId24"/>
+                <a:blip r:embed="rId15"/>
                 <a:stretch>
-                  <a:fillRect l="-12500" r="-12500" b="-20000"/>
+                  <a:fillRect l="-16667" r="-12500" b="-20000"/>
                 </a:stretch>
               </a:blipFill>
             </p:spPr>
@@ -7495,7 +5718,7 @@
         </p:nvCxnSpPr>
         <p:spPr>
           <a:xfrm flipH="1">
-            <a:off x="2483708" y="5661617"/>
+            <a:off x="3135349" y="4894362"/>
             <a:ext cx="1555321" cy="0"/>
           </a:xfrm>
           <a:prstGeom prst="straightConnector1">
@@ -7524,8 +5747,8 @@
           </a:fontRef>
         </p:style>
       </p:cxnSp>
-      <mc:AlternateContent xmlns:mc="http://schemas.openxmlformats.org/markup-compatibility/2006" xmlns:a14="http://schemas.microsoft.com/office/drawing/2010/main">
-        <mc:Choice Requires="a14">
+      <mc:AlternateContent xmlns:mc="http://schemas.openxmlformats.org/markup-compatibility/2006">
+        <mc:Choice xmlns:a14="http://schemas.microsoft.com/office/drawing/2010/main" Requires="a14">
           <p:sp>
             <p:nvSpPr>
               <p:cNvPr id="289" name="TextBox 288">
@@ -7540,7 +5763,7 @@
             </p:nvSpPr>
             <p:spPr>
               <a:xfrm>
-                <a:off x="3108865" y="5663158"/>
+                <a:off x="3760506" y="4895903"/>
                 <a:ext cx="283539" cy="246221"/>
               </a:xfrm>
               <a:prstGeom prst="rect">
@@ -7586,7 +5809,7 @@
             </p:txBody>
           </p:sp>
         </mc:Choice>
-        <mc:Fallback xmlns="">
+        <mc:Fallback>
           <p:sp>
             <p:nvSpPr>
               <p:cNvPr id="289" name="TextBox 288">
@@ -7603,16 +5826,16 @@
             </p:nvSpPr>
             <p:spPr>
               <a:xfrm>
-                <a:off x="3108865" y="5663158"/>
+                <a:off x="3760506" y="4895903"/>
                 <a:ext cx="283539" cy="246221"/>
               </a:xfrm>
               <a:prstGeom prst="rect">
                 <a:avLst/>
               </a:prstGeom>
               <a:blipFill>
-                <a:blip r:embed="rId25"/>
+                <a:blip r:embed="rId16"/>
                 <a:stretch>
-                  <a:fillRect l="-17391" r="-4348" b="-5000"/>
+                  <a:fillRect l="-17391" r="-8696" b="-4762"/>
                 </a:stretch>
               </a:blipFill>
             </p:spPr>
@@ -7631,14 +5854,14 @@
           </p:sp>
         </mc:Fallback>
       </mc:AlternateContent>
-      <mc:AlternateContent xmlns:mc="http://schemas.openxmlformats.org/markup-compatibility/2006" xmlns:a14="http://schemas.microsoft.com/office/drawing/2010/main">
-        <mc:Choice Requires="a14">
+      <mc:AlternateContent xmlns:mc="http://schemas.openxmlformats.org/markup-compatibility/2006">
+        <mc:Choice xmlns:a14="http://schemas.microsoft.com/office/drawing/2010/main" Requires="a14">
           <p:sp>
             <p:nvSpPr>
-              <p:cNvPr id="293" name="TextBox 292">
+              <p:cNvPr id="82" name="TextBox 81">
                 <a:extLst>
                   <a:ext uri="{FF2B5EF4-FFF2-40B4-BE49-F238E27FC236}">
-                    <a16:creationId xmlns:a16="http://schemas.microsoft.com/office/drawing/2014/main" id="{73096E8F-0939-694E-8B5B-DA26538F65FD}"/>
+                    <a16:creationId xmlns:a16="http://schemas.microsoft.com/office/drawing/2014/main" id="{362904C9-F7FE-4B4E-852C-EBFC19B3289D}"/>
                   </a:ext>
                 </a:extLst>
               </p:cNvPr>
@@ -7647,8 +5870,8 @@
             </p:nvSpPr>
             <p:spPr>
               <a:xfrm>
-                <a:off x="5695639" y="2024228"/>
-                <a:ext cx="181075" cy="276999"/>
+                <a:off x="4213335" y="2571685"/>
+                <a:ext cx="317138" cy="277768"/>
               </a:xfrm>
               <a:prstGeom prst="rect">
                 <a:avLst/>
@@ -7668,27 +5891,47 @@
                       <m:jc m:val="centerGroup"/>
                     </m:oMathParaPr>
                     <m:oMath xmlns:m="http://schemas.openxmlformats.org/officeDocument/2006/math">
-                      <m:r>
-                        <a:rPr lang="en-US" b="0" i="1" smtClean="0">
-                          <a:latin typeface="Cambria Math" panose="02040503050406030204" pitchFamily="18" charset="0"/>
-                        </a:rPr>
-                        <m:t>𝐿</m:t>
-                      </m:r>
+                      <m:sSubSup>
+                        <m:sSubSupPr>
+                          <m:ctrlPr>
+                            <a:rPr lang="en-US" sz="1600" b="0" i="1" smtClean="0">
+                              <a:latin typeface="Cambria Math" panose="02040503050406030204" pitchFamily="18" charset="0"/>
+                            </a:rPr>
+                          </m:ctrlPr>
+                        </m:sSubSupPr>
+                        <m:e>
+                          <m:r>
+                            <a:rPr lang="en-US" sz="1600" b="0" i="1" smtClean="0">
+                              <a:latin typeface="Cambria Math" panose="02040503050406030204" pitchFamily="18" charset="0"/>
+                            </a:rPr>
+                            <m:t>𝑣</m:t>
+                          </m:r>
+                        </m:e>
+                        <m:sub>
+                          <m:r>
+                            <a:rPr lang="en-US" sz="1600" b="0" i="1" smtClean="0">
+                              <a:latin typeface="Cambria Math" panose="02040503050406030204" pitchFamily="18" charset="0"/>
+                            </a:rPr>
+                            <m:t>𝑑</m:t>
+                          </m:r>
+                        </m:sub>
+                        <m:sup/>
+                      </m:sSubSup>
                     </m:oMath>
                   </m:oMathPara>
                 </a14:m>
-                <a:endParaRPr lang="en-US" dirty="0"/>
+                <a:endParaRPr lang="en-US" sz="1600" dirty="0"/>
               </a:p>
             </p:txBody>
           </p:sp>
         </mc:Choice>
-        <mc:Fallback xmlns="">
+        <mc:Fallback>
           <p:sp>
             <p:nvSpPr>
-              <p:cNvPr id="293" name="TextBox 292">
+              <p:cNvPr id="82" name="TextBox 81">
                 <a:extLst>
                   <a:ext uri="{FF2B5EF4-FFF2-40B4-BE49-F238E27FC236}">
-                    <a16:creationId xmlns:a16="http://schemas.microsoft.com/office/drawing/2014/main" id="{73096E8F-0939-694E-8B5B-DA26538F65FD}"/>
+                    <a16:creationId xmlns:a16="http://schemas.microsoft.com/office/drawing/2014/main" id="{362904C9-F7FE-4B4E-852C-EBFC19B3289D}"/>
                   </a:ext>
                 </a:extLst>
               </p:cNvPr>
@@ -7699,16 +5942,16 @@
             </p:nvSpPr>
             <p:spPr>
               <a:xfrm>
-                <a:off x="5695639" y="2024228"/>
-                <a:ext cx="181075" cy="276999"/>
+                <a:off x="4213335" y="2571685"/>
+                <a:ext cx="317138" cy="277768"/>
               </a:xfrm>
               <a:prstGeom prst="rect">
                 <a:avLst/>
               </a:prstGeom>
               <a:blipFill>
-                <a:blip r:embed="rId26"/>
+                <a:blip r:embed="rId17"/>
                 <a:stretch>
-                  <a:fillRect l="-18750" r="-18750" b="-4348"/>
+                  <a:fillRect l="-7692" b="-17391"/>
                 </a:stretch>
               </a:blipFill>
             </p:spPr>
@@ -7730,7 +5973,7 @@
     </p:spTree>
     <p:extLst>
       <p:ext uri="{BB962C8B-B14F-4D97-AF65-F5344CB8AC3E}">
-        <p14:creationId xmlns:p14="http://schemas.microsoft.com/office/powerpoint/2010/main" val="876852115"/>
+        <p14:creationId xmlns:p14="http://schemas.microsoft.com/office/powerpoint/2010/main" val="1575333499"/>
       </p:ext>
     </p:extLst>
   </p:cSld>

</xml_diff>